<commit_message>
eliminated most of the pages as unneded
</commit_message>
<xml_diff>
--- a/IntoAdventure.pptx
+++ b/IntoAdventure.pptx
@@ -5,22 +5,13 @@
     <p:sldMasterId id="2147483660" r:id="rId1"/>
   </p:sldMasterIdLst>
   <p:notesMasterIdLst>
-    <p:notesMasterId r:id="rId15"/>
+    <p:notesMasterId r:id="rId6"/>
   </p:notesMasterIdLst>
   <p:sldIdLst>
     <p:sldId id="256" r:id="rId2"/>
     <p:sldId id="257" r:id="rId3"/>
     <p:sldId id="258" r:id="rId4"/>
     <p:sldId id="259" r:id="rId5"/>
-    <p:sldId id="268" r:id="rId6"/>
-    <p:sldId id="260" r:id="rId7"/>
-    <p:sldId id="264" r:id="rId8"/>
-    <p:sldId id="261" r:id="rId9"/>
-    <p:sldId id="265" r:id="rId10"/>
-    <p:sldId id="262" r:id="rId11"/>
-    <p:sldId id="266" r:id="rId12"/>
-    <p:sldId id="263" r:id="rId13"/>
-    <p:sldId id="267" r:id="rId14"/>
   </p:sldIdLst>
   <p:sldSz cx="9144000" cy="6858000" type="screen4x3"/>
   <p:notesSz cx="6858000" cy="9144000"/>
@@ -518,15 +509,11 @@
           <a:p>
             <a:r>
               <a:rPr lang="en-US" dirty="0" smtClean="0"/>
-              <a:t>If you are</a:t>
+              <a:t>It is an</a:t>
             </a:r>
             <a:r>
               <a:rPr lang="en-US" baseline="0" dirty="0" smtClean="0"/>
-              <a:t> working on C#, you have already seen a few of the things that I’m going </a:t>
-            </a:r>
-            <a:r>
-              <a:rPr lang="en-US" baseline="0" smtClean="0"/>
-              <a:t>to describe</a:t>
+              <a:t> adventure. Something new, something different.</a:t>
             </a:r>
             <a:endParaRPr lang="en-US" dirty="0"/>
           </a:p>
@@ -549,7 +536,7 @@
           <a:p>
             <a:fld id="{95465083-45B2-BB46-ACD6-3F05CA4DF6BC}" type="slidenum">
               <a:rPr lang="en-US" smtClean="0"/>
-              <a:t>4</a:t>
+              <a:t>1</a:t>
             </a:fld>
             <a:endParaRPr lang="en-US"/>
           </a:p>
@@ -558,7 +545,7 @@
     </p:spTree>
     <p:extLst>
       <p:ext uri="{BB962C8B-B14F-4D97-AF65-F5344CB8AC3E}">
-        <p14:creationId xmlns:p14="http://schemas.microsoft.com/office/powerpoint/2010/main" val="1284344433"/>
+        <p14:creationId xmlns:p14="http://schemas.microsoft.com/office/powerpoint/2010/main" val="351403918"/>
       </p:ext>
     </p:extLst>
   </p:cSld>
@@ -614,30 +601,9 @@
           <a:p>
             <a:r>
               <a:rPr lang="en-US" dirty="0" smtClean="0"/>
-              <a:t>C # - My bread and butter</a:t>
-            </a:r>
-            <a:r>
-              <a:rPr lang="en-US" baseline="0" dirty="0" smtClean="0"/>
-              <a:t>  - F# </a:t>
-            </a:r>
-          </a:p>
-          <a:p>
-            <a:r>
-              <a:rPr lang="en-US" baseline="0" dirty="0" smtClean="0"/>
-              <a:t>Java – </a:t>
-            </a:r>
-            <a:r>
-              <a:rPr lang="en-US" baseline="0" dirty="0" err="1" smtClean="0"/>
-              <a:t>Clojure</a:t>
-            </a:r>
-            <a:endParaRPr lang="en-US" baseline="0" dirty="0" smtClean="0"/>
-          </a:p>
-          <a:p>
-            <a:r>
-              <a:rPr lang="en-US" baseline="0" dirty="0" smtClean="0"/>
-              <a:t>Python - Elixir</a:t>
-            </a:r>
-            <a:endParaRPr lang="en-US" dirty="0" smtClean="0"/>
+              <a:t>I’m a beginner on FP</a:t>
+            </a:r>
+            <a:endParaRPr lang="en-US" dirty="0"/>
           </a:p>
         </p:txBody>
       </p:sp>
@@ -658,7 +624,7 @@
           <a:p>
             <a:fld id="{95465083-45B2-BB46-ACD6-3F05CA4DF6BC}" type="slidenum">
               <a:rPr lang="en-US" smtClean="0"/>
-              <a:t>5</a:t>
+              <a:t>2</a:t>
             </a:fld>
             <a:endParaRPr lang="en-US"/>
           </a:p>
@@ -667,7 +633,7 @@
     </p:spTree>
     <p:extLst>
       <p:ext uri="{BB962C8B-B14F-4D97-AF65-F5344CB8AC3E}">
-        <p14:creationId xmlns:p14="http://schemas.microsoft.com/office/powerpoint/2010/main" val="70957005"/>
+        <p14:creationId xmlns:p14="http://schemas.microsoft.com/office/powerpoint/2010/main" val="3671243543"/>
       </p:ext>
     </p:extLst>
   </p:cSld>
@@ -723,15 +689,17 @@
           <a:p>
             <a:r>
               <a:rPr lang="en-US" dirty="0" smtClean="0"/>
-              <a:t>Scott </a:t>
-            </a:r>
-            <a:r>
-              <a:rPr lang="en-US" dirty="0" err="1" smtClean="0"/>
-              <a:t>Wlaschin</a:t>
+              <a:t>Eric S. Raymond Lisp</a:t>
             </a:r>
             <a:r>
               <a:rPr lang="en-US" baseline="0" dirty="0" smtClean="0"/>
-              <a:t> -&gt; All patterns replaced by functions.</a:t>
+              <a:t> will make you a better programmer</a:t>
+            </a:r>
+          </a:p>
+          <a:p>
+            <a:r>
+              <a:rPr lang="en-US" baseline="0" dirty="0" smtClean="0"/>
+              <a:t>Robert C. Martin NDC London 2013 conference talk</a:t>
             </a:r>
             <a:endParaRPr lang="en-US" dirty="0"/>
           </a:p>
@@ -754,7 +722,7 @@
           <a:p>
             <a:fld id="{95465083-45B2-BB46-ACD6-3F05CA4DF6BC}" type="slidenum">
               <a:rPr lang="en-US" smtClean="0"/>
-              <a:t>7</a:t>
+              <a:t>3</a:t>
             </a:fld>
             <a:endParaRPr lang="en-US"/>
           </a:p>
@@ -763,7 +731,117 @@
     </p:spTree>
     <p:extLst>
       <p:ext uri="{BB962C8B-B14F-4D97-AF65-F5344CB8AC3E}">
-        <p14:creationId xmlns:p14="http://schemas.microsoft.com/office/powerpoint/2010/main" val="770928482"/>
+        <p14:creationId xmlns:p14="http://schemas.microsoft.com/office/powerpoint/2010/main" val="423430811"/>
+      </p:ext>
+    </p:extLst>
+  </p:cSld>
+  <p:clrMapOvr>
+    <a:masterClrMapping/>
+  </p:clrMapOvr>
+</p:notes>
+</file>
+
+<file path=ppt/notesSlides/notesSlide4.xml><?xml version="1.0" encoding="utf-8"?>
+<p:notes xmlns:a="http://schemas.openxmlformats.org/drawingml/2006/main" xmlns:r="http://schemas.openxmlformats.org/officeDocument/2006/relationships" xmlns:p="http://schemas.openxmlformats.org/presentationml/2006/main">
+  <p:cSld>
+    <p:spTree>
+      <p:nvGrpSpPr>
+        <p:cNvPr id="1" name=""/>
+        <p:cNvGrpSpPr/>
+        <p:nvPr/>
+      </p:nvGrpSpPr>
+      <p:grpSpPr>
+        <a:xfrm>
+          <a:off x="0" y="0"/>
+          <a:ext cx="0" cy="0"/>
+          <a:chOff x="0" y="0"/>
+          <a:chExt cx="0" cy="0"/>
+        </a:xfrm>
+      </p:grpSpPr>
+      <p:sp>
+        <p:nvSpPr>
+          <p:cNvPr id="2" name="Slide Image Placeholder 1"/>
+          <p:cNvSpPr>
+            <a:spLocks noGrp="1" noRot="1" noChangeAspect="1"/>
+          </p:cNvSpPr>
+          <p:nvPr>
+            <p:ph type="sldImg"/>
+          </p:nvPr>
+        </p:nvSpPr>
+        <p:spPr/>
+      </p:sp>
+      <p:sp>
+        <p:nvSpPr>
+          <p:cNvPr id="3" name="Notes Placeholder 2"/>
+          <p:cNvSpPr>
+            <a:spLocks noGrp="1"/>
+          </p:cNvSpPr>
+          <p:nvPr>
+            <p:ph type="body" idx="1"/>
+          </p:nvPr>
+        </p:nvSpPr>
+        <p:spPr/>
+        <p:txBody>
+          <a:bodyPr/>
+          <a:lstStyle/>
+          <a:p>
+            <a:r>
+              <a:rPr lang="en-US" dirty="0" smtClean="0"/>
+              <a:t>We will show code, but do not concentrate on its lack</a:t>
+            </a:r>
+            <a:r>
+              <a:rPr lang="en-US" baseline="0" dirty="0" smtClean="0"/>
+              <a:t> of beautifulness. It is the ideas that we are interested on.</a:t>
+            </a:r>
+            <a:endParaRPr lang="en-US" dirty="0" smtClean="0"/>
+          </a:p>
+          <a:p>
+            <a:r>
+              <a:rPr lang="en-US" dirty="0" smtClean="0"/>
+              <a:t>If you are</a:t>
+            </a:r>
+            <a:r>
+              <a:rPr lang="en-US" baseline="0" dirty="0" smtClean="0"/>
+              <a:t> working on C#, you have already seen a few of the things that I’m going to describe. </a:t>
+            </a:r>
+            <a:r>
+              <a:rPr lang="en-US" baseline="0" dirty="0" err="1" smtClean="0"/>
+              <a:t>LinQ</a:t>
+            </a:r>
+            <a:endParaRPr lang="en-US" baseline="0" dirty="0" smtClean="0"/>
+          </a:p>
+          <a:p>
+            <a:endParaRPr lang="en-US" dirty="0"/>
+          </a:p>
+        </p:txBody>
+      </p:sp>
+      <p:sp>
+        <p:nvSpPr>
+          <p:cNvPr id="4" name="Slide Number Placeholder 3"/>
+          <p:cNvSpPr>
+            <a:spLocks noGrp="1"/>
+          </p:cNvSpPr>
+          <p:nvPr>
+            <p:ph type="sldNum" sz="quarter" idx="10"/>
+          </p:nvPr>
+        </p:nvSpPr>
+        <p:spPr/>
+        <p:txBody>
+          <a:bodyPr/>
+          <a:lstStyle/>
+          <a:p>
+            <a:fld id="{95465083-45B2-BB46-ACD6-3F05CA4DF6BC}" type="slidenum">
+              <a:rPr lang="en-US" smtClean="0"/>
+              <a:t>4</a:t>
+            </a:fld>
+            <a:endParaRPr lang="en-US"/>
+          </a:p>
+        </p:txBody>
+      </p:sp>
+    </p:spTree>
+    <p:extLst>
+      <p:ext uri="{BB962C8B-B14F-4D97-AF65-F5344CB8AC3E}">
+        <p14:creationId xmlns:p14="http://schemas.microsoft.com/office/powerpoint/2010/main" val="1284344433"/>
       </p:ext>
     </p:extLst>
   </p:cSld>
@@ -4404,302 +4482,6 @@
 </p:sld>
 </file>
 
-<file path=ppt/slides/slide10.xml><?xml version="1.0" encoding="utf-8"?>
-<p:sld xmlns:a="http://schemas.openxmlformats.org/drawingml/2006/main" xmlns:r="http://schemas.openxmlformats.org/officeDocument/2006/relationships" xmlns:p="http://schemas.openxmlformats.org/presentationml/2006/main">
-  <p:cSld>
-    <p:spTree>
-      <p:nvGrpSpPr>
-        <p:cNvPr id="1" name=""/>
-        <p:cNvGrpSpPr/>
-        <p:nvPr/>
-      </p:nvGrpSpPr>
-      <p:grpSpPr>
-        <a:xfrm>
-          <a:off x="0" y="0"/>
-          <a:ext cx="0" cy="0"/>
-          <a:chOff x="0" y="0"/>
-          <a:chExt cx="0" cy="0"/>
-        </a:xfrm>
-      </p:grpSpPr>
-      <p:sp>
-        <p:nvSpPr>
-          <p:cNvPr id="2" name="Title 1"/>
-          <p:cNvSpPr>
-            <a:spLocks noGrp="1"/>
-          </p:cNvSpPr>
-          <p:nvPr>
-            <p:ph type="title"/>
-          </p:nvPr>
-        </p:nvSpPr>
-        <p:spPr/>
-        <p:txBody>
-          <a:bodyPr>
-            <a:normAutofit/>
-          </a:bodyPr>
-          <a:lstStyle/>
-          <a:p>
-            <a:r>
-              <a:rPr lang="en-US" dirty="0" smtClean="0">
-                <a:solidFill>
-                  <a:srgbClr val="A8C6D0"/>
-                </a:solidFill>
-              </a:rPr>
-              <a:t>Chaining</a:t>
-            </a:r>
-            <a:endParaRPr lang="en-US" dirty="0">
-              <a:solidFill>
-                <a:srgbClr val="A8C6D0"/>
-              </a:solidFill>
-            </a:endParaRPr>
-          </a:p>
-        </p:txBody>
-      </p:sp>
-    </p:spTree>
-    <p:extLst>
-      <p:ext uri="{BB962C8B-B14F-4D97-AF65-F5344CB8AC3E}">
-        <p14:creationId xmlns:p14="http://schemas.microsoft.com/office/powerpoint/2010/main" val="1016197920"/>
-      </p:ext>
-    </p:extLst>
-  </p:cSld>
-  <p:clrMapOvr>
-    <a:masterClrMapping/>
-  </p:clrMapOvr>
-  <p:timing>
-    <p:tnLst>
-      <p:par>
-        <p:cTn xmlns:p14="http://schemas.microsoft.com/office/powerpoint/2010/main" id="1" dur="indefinite" restart="never" nodeType="tmRoot"/>
-      </p:par>
-    </p:tnLst>
-  </p:timing>
-</p:sld>
-</file>
-
-<file path=ppt/slides/slide11.xml><?xml version="1.0" encoding="utf-8"?>
-<p:sld xmlns:a="http://schemas.openxmlformats.org/drawingml/2006/main" xmlns:r="http://schemas.openxmlformats.org/officeDocument/2006/relationships" xmlns:p="http://schemas.openxmlformats.org/presentationml/2006/main">
-  <p:cSld>
-    <p:spTree>
-      <p:nvGrpSpPr>
-        <p:cNvPr id="1" name=""/>
-        <p:cNvGrpSpPr/>
-        <p:nvPr/>
-      </p:nvGrpSpPr>
-      <p:grpSpPr>
-        <a:xfrm>
-          <a:off x="0" y="0"/>
-          <a:ext cx="0" cy="0"/>
-          <a:chOff x="0" y="0"/>
-          <a:chExt cx="0" cy="0"/>
-        </a:xfrm>
-      </p:grpSpPr>
-      <p:sp>
-        <p:nvSpPr>
-          <p:cNvPr id="2" name="Title 1"/>
-          <p:cNvSpPr>
-            <a:spLocks noGrp="1"/>
-          </p:cNvSpPr>
-          <p:nvPr>
-            <p:ph type="title"/>
-          </p:nvPr>
-        </p:nvSpPr>
-        <p:spPr/>
-        <p:txBody>
-          <a:bodyPr>
-            <a:normAutofit/>
-          </a:bodyPr>
-          <a:lstStyle/>
-          <a:p>
-            <a:r>
-              <a:rPr lang="en-US" dirty="0" smtClean="0">
-                <a:solidFill>
-                  <a:srgbClr val="A8C6D0"/>
-                </a:solidFill>
-              </a:rPr>
-              <a:t>Chaining</a:t>
-            </a:r>
-            <a:endParaRPr lang="en-US" dirty="0">
-              <a:solidFill>
-                <a:srgbClr val="A8C6D0"/>
-              </a:solidFill>
-            </a:endParaRPr>
-          </a:p>
-        </p:txBody>
-      </p:sp>
-    </p:spTree>
-    <p:extLst>
-      <p:ext uri="{BB962C8B-B14F-4D97-AF65-F5344CB8AC3E}">
-        <p14:creationId xmlns:p14="http://schemas.microsoft.com/office/powerpoint/2010/main" val="3879051379"/>
-      </p:ext>
-    </p:extLst>
-  </p:cSld>
-  <p:clrMapOvr>
-    <a:masterClrMapping/>
-  </p:clrMapOvr>
-  <p:timing>
-    <p:tnLst>
-      <p:par>
-        <p:cTn xmlns:p14="http://schemas.microsoft.com/office/powerpoint/2010/main" id="1" dur="indefinite" restart="never" nodeType="tmRoot"/>
-      </p:par>
-    </p:tnLst>
-  </p:timing>
-</p:sld>
-</file>
-
-<file path=ppt/slides/slide12.xml><?xml version="1.0" encoding="utf-8"?>
-<p:sld xmlns:a="http://schemas.openxmlformats.org/drawingml/2006/main" xmlns:r="http://schemas.openxmlformats.org/officeDocument/2006/relationships" xmlns:p="http://schemas.openxmlformats.org/presentationml/2006/main">
-  <p:cSld>
-    <p:spTree>
-      <p:nvGrpSpPr>
-        <p:cNvPr id="1" name=""/>
-        <p:cNvGrpSpPr/>
-        <p:nvPr/>
-      </p:nvGrpSpPr>
-      <p:grpSpPr>
-        <a:xfrm>
-          <a:off x="0" y="0"/>
-          <a:ext cx="0" cy="0"/>
-          <a:chOff x="0" y="0"/>
-          <a:chExt cx="0" cy="0"/>
-        </a:xfrm>
-      </p:grpSpPr>
-      <p:sp>
-        <p:nvSpPr>
-          <p:cNvPr id="2" name="Title 1"/>
-          <p:cNvSpPr>
-            <a:spLocks noGrp="1"/>
-          </p:cNvSpPr>
-          <p:nvPr>
-            <p:ph type="title"/>
-          </p:nvPr>
-        </p:nvSpPr>
-        <p:spPr/>
-        <p:txBody>
-          <a:bodyPr>
-            <a:normAutofit/>
-          </a:bodyPr>
-          <a:lstStyle/>
-          <a:p>
-            <a:r>
-              <a:rPr lang="en-US" dirty="0">
-                <a:solidFill>
-                  <a:srgbClr val="A8C6D0"/>
-                </a:solidFill>
-              </a:rPr>
-              <a:t>Pattern </a:t>
-            </a:r>
-            <a:r>
-              <a:rPr lang="en-US" dirty="0" smtClean="0">
-                <a:solidFill>
-                  <a:srgbClr val="A8C6D0"/>
-                </a:solidFill>
-              </a:rPr>
-              <a:t>Matching</a:t>
-            </a:r>
-            <a:endParaRPr lang="en-US" dirty="0">
-              <a:solidFill>
-                <a:srgbClr val="A8C6D0"/>
-              </a:solidFill>
-            </a:endParaRPr>
-          </a:p>
-        </p:txBody>
-      </p:sp>
-    </p:spTree>
-    <p:extLst>
-      <p:ext uri="{BB962C8B-B14F-4D97-AF65-F5344CB8AC3E}">
-        <p14:creationId xmlns:p14="http://schemas.microsoft.com/office/powerpoint/2010/main" val="426304230"/>
-      </p:ext>
-    </p:extLst>
-  </p:cSld>
-  <p:clrMapOvr>
-    <a:masterClrMapping/>
-  </p:clrMapOvr>
-  <p:timing>
-    <p:tnLst>
-      <p:par>
-        <p:cTn xmlns:p14="http://schemas.microsoft.com/office/powerpoint/2010/main" id="1" dur="indefinite" restart="never" nodeType="tmRoot"/>
-      </p:par>
-    </p:tnLst>
-  </p:timing>
-</p:sld>
-</file>
-
-<file path=ppt/slides/slide13.xml><?xml version="1.0" encoding="utf-8"?>
-<p:sld xmlns:a="http://schemas.openxmlformats.org/drawingml/2006/main" xmlns:r="http://schemas.openxmlformats.org/officeDocument/2006/relationships" xmlns:p="http://schemas.openxmlformats.org/presentationml/2006/main">
-  <p:cSld>
-    <p:spTree>
-      <p:nvGrpSpPr>
-        <p:cNvPr id="1" name=""/>
-        <p:cNvGrpSpPr/>
-        <p:nvPr/>
-      </p:nvGrpSpPr>
-      <p:grpSpPr>
-        <a:xfrm>
-          <a:off x="0" y="0"/>
-          <a:ext cx="0" cy="0"/>
-          <a:chOff x="0" y="0"/>
-          <a:chExt cx="0" cy="0"/>
-        </a:xfrm>
-      </p:grpSpPr>
-      <p:sp>
-        <p:nvSpPr>
-          <p:cNvPr id="2" name="Title 1"/>
-          <p:cNvSpPr>
-            <a:spLocks noGrp="1"/>
-          </p:cNvSpPr>
-          <p:nvPr>
-            <p:ph type="title"/>
-          </p:nvPr>
-        </p:nvSpPr>
-        <p:spPr/>
-        <p:txBody>
-          <a:bodyPr>
-            <a:normAutofit/>
-          </a:bodyPr>
-          <a:lstStyle/>
-          <a:p>
-            <a:r>
-              <a:rPr lang="en-US" dirty="0">
-                <a:solidFill>
-                  <a:srgbClr val="A8C6D0"/>
-                </a:solidFill>
-              </a:rPr>
-              <a:t>Pattern </a:t>
-            </a:r>
-            <a:r>
-              <a:rPr lang="en-US" dirty="0" smtClean="0">
-                <a:solidFill>
-                  <a:srgbClr val="A8C6D0"/>
-                </a:solidFill>
-              </a:rPr>
-              <a:t>Matching</a:t>
-            </a:r>
-            <a:endParaRPr lang="en-US" dirty="0">
-              <a:solidFill>
-                <a:srgbClr val="A8C6D0"/>
-              </a:solidFill>
-            </a:endParaRPr>
-          </a:p>
-        </p:txBody>
-      </p:sp>
-    </p:spTree>
-    <p:extLst>
-      <p:ext uri="{BB962C8B-B14F-4D97-AF65-F5344CB8AC3E}">
-        <p14:creationId xmlns:p14="http://schemas.microsoft.com/office/powerpoint/2010/main" val="3751042565"/>
-      </p:ext>
-    </p:extLst>
-  </p:cSld>
-  <p:clrMapOvr>
-    <a:masterClrMapping/>
-  </p:clrMapOvr>
-  <p:timing>
-    <p:tnLst>
-      <p:par>
-        <p:cTn xmlns:p14="http://schemas.microsoft.com/office/powerpoint/2010/main" id="1" dur="indefinite" restart="never" nodeType="tmRoot"/>
-      </p:par>
-    </p:tnLst>
-  </p:timing>
-</p:sld>
-</file>
-
 <file path=ppt/slides/slide2.xml><?xml version="1.0" encoding="utf-8"?>
 <p:sld xmlns:a="http://schemas.openxmlformats.org/drawingml/2006/main" xmlns:r="http://schemas.openxmlformats.org/officeDocument/2006/relationships" xmlns:p="http://schemas.openxmlformats.org/presentationml/2006/main">
   <p:cSld>
@@ -4763,7 +4545,7 @@
           <p:nvPr/>
         </p:nvPicPr>
         <p:blipFill>
-          <a:blip r:embed="rId2">
+          <a:blip r:embed="rId3">
             <a:extLst>
               <a:ext uri="{28A0092B-C50C-407E-A947-70E740481C1C}">
                 <a14:useLocalDpi xmlns:a14="http://schemas.microsoft.com/office/drawing/2010/main" val="0"/>
@@ -5783,375 +5565,46 @@
           </a:p>
         </p:txBody>
       </p:sp>
+      <p:sp>
+        <p:nvSpPr>
+          <p:cNvPr id="10" name="TextBox 9"/>
+          <p:cNvSpPr txBox="1"/>
+          <p:nvPr/>
+        </p:nvSpPr>
+        <p:spPr>
+          <a:xfrm>
+            <a:off x="2538780" y="5316487"/>
+            <a:ext cx="3852337" cy="523220"/>
+          </a:xfrm>
+          <a:prstGeom prst="rect">
+            <a:avLst/>
+          </a:prstGeom>
+          <a:noFill/>
+        </p:spPr>
+        <p:txBody>
+          <a:bodyPr wrap="none" rtlCol="0">
+            <a:spAutoFit/>
+          </a:bodyPr>
+          <a:lstStyle/>
+          <a:p>
+            <a:r>
+              <a:rPr lang="en-US" sz="2800" dirty="0" smtClean="0">
+                <a:latin typeface="Franklin Gothic Book"/>
+                <a:cs typeface="Franklin Gothic Book"/>
+              </a:rPr>
+              <a:t>Binding and Assignment</a:t>
+            </a:r>
+            <a:endParaRPr lang="en-US" sz="2800" dirty="0">
+              <a:latin typeface="Franklin Gothic Book"/>
+              <a:cs typeface="Franklin Gothic Book"/>
+            </a:endParaRPr>
+          </a:p>
+        </p:txBody>
+      </p:sp>
     </p:spTree>
     <p:extLst>
       <p:ext uri="{BB962C8B-B14F-4D97-AF65-F5344CB8AC3E}">
         <p14:creationId xmlns:p14="http://schemas.microsoft.com/office/powerpoint/2010/main" val="2221002305"/>
-      </p:ext>
-    </p:extLst>
-  </p:cSld>
-  <p:clrMapOvr>
-    <a:masterClrMapping/>
-  </p:clrMapOvr>
-  <p:timing>
-    <p:tnLst>
-      <p:par>
-        <p:cTn xmlns:p14="http://schemas.microsoft.com/office/powerpoint/2010/main" id="1" dur="indefinite" restart="never" nodeType="tmRoot"/>
-      </p:par>
-    </p:tnLst>
-  </p:timing>
-</p:sld>
-</file>
-
-<file path=ppt/slides/slide5.xml><?xml version="1.0" encoding="utf-8"?>
-<p:sld xmlns:a="http://schemas.openxmlformats.org/drawingml/2006/main" xmlns:r="http://schemas.openxmlformats.org/officeDocument/2006/relationships" xmlns:p="http://schemas.openxmlformats.org/presentationml/2006/main">
-  <p:cSld>
-    <p:spTree>
-      <p:nvGrpSpPr>
-        <p:cNvPr id="1" name=""/>
-        <p:cNvGrpSpPr/>
-        <p:nvPr/>
-      </p:nvGrpSpPr>
-      <p:grpSpPr>
-        <a:xfrm>
-          <a:off x="0" y="0"/>
-          <a:ext cx="0" cy="0"/>
-          <a:chOff x="0" y="0"/>
-          <a:chExt cx="0" cy="0"/>
-        </a:xfrm>
-      </p:grpSpPr>
-    </p:spTree>
-    <p:extLst>
-      <p:ext uri="{BB962C8B-B14F-4D97-AF65-F5344CB8AC3E}">
-        <p14:creationId xmlns:p14="http://schemas.microsoft.com/office/powerpoint/2010/main" val="777626367"/>
-      </p:ext>
-    </p:extLst>
-  </p:cSld>
-  <p:clrMapOvr>
-    <a:masterClrMapping/>
-  </p:clrMapOvr>
-  <p:timing>
-    <p:tnLst>
-      <p:par>
-        <p:cTn xmlns:p14="http://schemas.microsoft.com/office/powerpoint/2010/main" id="1" dur="indefinite" restart="never" nodeType="tmRoot"/>
-      </p:par>
-    </p:tnLst>
-  </p:timing>
-</p:sld>
-</file>
-
-<file path=ppt/slides/slide6.xml><?xml version="1.0" encoding="utf-8"?>
-<p:sld xmlns:a="http://schemas.openxmlformats.org/drawingml/2006/main" xmlns:r="http://schemas.openxmlformats.org/officeDocument/2006/relationships" xmlns:p="http://schemas.openxmlformats.org/presentationml/2006/main">
-  <p:cSld>
-    <p:spTree>
-      <p:nvGrpSpPr>
-        <p:cNvPr id="1" name=""/>
-        <p:cNvGrpSpPr/>
-        <p:nvPr/>
-      </p:nvGrpSpPr>
-      <p:grpSpPr>
-        <a:xfrm>
-          <a:off x="0" y="0"/>
-          <a:ext cx="0" cy="0"/>
-          <a:chOff x="0" y="0"/>
-          <a:chExt cx="0" cy="0"/>
-        </a:xfrm>
-      </p:grpSpPr>
-      <p:sp>
-        <p:nvSpPr>
-          <p:cNvPr id="2" name="Title 1"/>
-          <p:cNvSpPr>
-            <a:spLocks noGrp="1"/>
-          </p:cNvSpPr>
-          <p:nvPr>
-            <p:ph type="title"/>
-          </p:nvPr>
-        </p:nvSpPr>
-        <p:spPr/>
-        <p:txBody>
-          <a:bodyPr>
-            <a:normAutofit fontScale="90000"/>
-          </a:bodyPr>
-          <a:lstStyle/>
-          <a:p>
-            <a:r>
-              <a:rPr lang="en-US" dirty="0">
-                <a:solidFill>
-                  <a:srgbClr val="A8C6D0"/>
-                </a:solidFill>
-              </a:rPr>
-              <a:t>Classes/Interfaces </a:t>
-            </a:r>
-            <a:r>
-              <a:rPr lang="en-US" dirty="0" err="1">
-                <a:solidFill>
-                  <a:srgbClr val="A8C6D0"/>
-                </a:solidFill>
-              </a:rPr>
-              <a:t>vs</a:t>
-            </a:r>
-            <a:r>
-              <a:rPr lang="en-US" dirty="0">
-                <a:solidFill>
-                  <a:srgbClr val="A8C6D0"/>
-                </a:solidFill>
-              </a:rPr>
-              <a:t> </a:t>
-            </a:r>
-            <a:r>
-              <a:rPr lang="en-US" dirty="0" smtClean="0">
-                <a:solidFill>
-                  <a:srgbClr val="A8C6D0"/>
-                </a:solidFill>
-              </a:rPr>
-              <a:t>Functions</a:t>
-            </a:r>
-            <a:endParaRPr lang="en-US" dirty="0">
-              <a:solidFill>
-                <a:srgbClr val="A8C6D0"/>
-              </a:solidFill>
-            </a:endParaRPr>
-          </a:p>
-        </p:txBody>
-      </p:sp>
-    </p:spTree>
-    <p:extLst>
-      <p:ext uri="{BB962C8B-B14F-4D97-AF65-F5344CB8AC3E}">
-        <p14:creationId xmlns:p14="http://schemas.microsoft.com/office/powerpoint/2010/main" val="3423078370"/>
-      </p:ext>
-    </p:extLst>
-  </p:cSld>
-  <p:clrMapOvr>
-    <a:masterClrMapping/>
-  </p:clrMapOvr>
-  <p:timing>
-    <p:tnLst>
-      <p:par>
-        <p:cTn xmlns:p14="http://schemas.microsoft.com/office/powerpoint/2010/main" id="1" dur="indefinite" restart="never" nodeType="tmRoot"/>
-      </p:par>
-    </p:tnLst>
-  </p:timing>
-</p:sld>
-</file>
-
-<file path=ppt/slides/slide7.xml><?xml version="1.0" encoding="utf-8"?>
-<p:sld xmlns:a="http://schemas.openxmlformats.org/drawingml/2006/main" xmlns:r="http://schemas.openxmlformats.org/officeDocument/2006/relationships" xmlns:p="http://schemas.openxmlformats.org/presentationml/2006/main">
-  <p:cSld>
-    <p:spTree>
-      <p:nvGrpSpPr>
-        <p:cNvPr id="1" name=""/>
-        <p:cNvGrpSpPr/>
-        <p:nvPr/>
-      </p:nvGrpSpPr>
-      <p:grpSpPr>
-        <a:xfrm>
-          <a:off x="0" y="0"/>
-          <a:ext cx="0" cy="0"/>
-          <a:chOff x="0" y="0"/>
-          <a:chExt cx="0" cy="0"/>
-        </a:xfrm>
-      </p:grpSpPr>
-      <p:sp>
-        <p:nvSpPr>
-          <p:cNvPr id="2" name="Title 1"/>
-          <p:cNvSpPr>
-            <a:spLocks noGrp="1"/>
-          </p:cNvSpPr>
-          <p:nvPr>
-            <p:ph type="title"/>
-          </p:nvPr>
-        </p:nvSpPr>
-        <p:spPr/>
-        <p:txBody>
-          <a:bodyPr>
-            <a:normAutofit fontScale="90000"/>
-          </a:bodyPr>
-          <a:lstStyle/>
-          <a:p>
-            <a:r>
-              <a:rPr lang="en-US" dirty="0">
-                <a:solidFill>
-                  <a:srgbClr val="A8C6D0"/>
-                </a:solidFill>
-              </a:rPr>
-              <a:t>Classes/Interfaces </a:t>
-            </a:r>
-            <a:r>
-              <a:rPr lang="en-US" dirty="0" err="1">
-                <a:solidFill>
-                  <a:srgbClr val="A8C6D0"/>
-                </a:solidFill>
-              </a:rPr>
-              <a:t>vs</a:t>
-            </a:r>
-            <a:r>
-              <a:rPr lang="en-US" dirty="0">
-                <a:solidFill>
-                  <a:srgbClr val="A8C6D0"/>
-                </a:solidFill>
-              </a:rPr>
-              <a:t> </a:t>
-            </a:r>
-            <a:r>
-              <a:rPr lang="en-US" dirty="0" smtClean="0">
-                <a:solidFill>
-                  <a:srgbClr val="A8C6D0"/>
-                </a:solidFill>
-              </a:rPr>
-              <a:t>Functions</a:t>
-            </a:r>
-            <a:endParaRPr lang="en-US" dirty="0">
-              <a:solidFill>
-                <a:srgbClr val="A8C6D0"/>
-              </a:solidFill>
-            </a:endParaRPr>
-          </a:p>
-        </p:txBody>
-      </p:sp>
-    </p:spTree>
-    <p:extLst>
-      <p:ext uri="{BB962C8B-B14F-4D97-AF65-F5344CB8AC3E}">
-        <p14:creationId xmlns:p14="http://schemas.microsoft.com/office/powerpoint/2010/main" val="1390698590"/>
-      </p:ext>
-    </p:extLst>
-  </p:cSld>
-  <p:clrMapOvr>
-    <a:masterClrMapping/>
-  </p:clrMapOvr>
-  <p:timing>
-    <p:tnLst>
-      <p:par>
-        <p:cTn xmlns:p14="http://schemas.microsoft.com/office/powerpoint/2010/main" id="1" dur="indefinite" restart="never" nodeType="tmRoot"/>
-      </p:par>
-    </p:tnLst>
-  </p:timing>
-</p:sld>
-</file>
-
-<file path=ppt/slides/slide8.xml><?xml version="1.0" encoding="utf-8"?>
-<p:sld xmlns:a="http://schemas.openxmlformats.org/drawingml/2006/main" xmlns:r="http://schemas.openxmlformats.org/officeDocument/2006/relationships" xmlns:p="http://schemas.openxmlformats.org/presentationml/2006/main">
-  <p:cSld>
-    <p:spTree>
-      <p:nvGrpSpPr>
-        <p:cNvPr id="1" name=""/>
-        <p:cNvGrpSpPr/>
-        <p:nvPr/>
-      </p:nvGrpSpPr>
-      <p:grpSpPr>
-        <a:xfrm>
-          <a:off x="0" y="0"/>
-          <a:ext cx="0" cy="0"/>
-          <a:chOff x="0" y="0"/>
-          <a:chExt cx="0" cy="0"/>
-        </a:xfrm>
-      </p:grpSpPr>
-      <p:sp>
-        <p:nvSpPr>
-          <p:cNvPr id="2" name="Title 1"/>
-          <p:cNvSpPr>
-            <a:spLocks noGrp="1"/>
-          </p:cNvSpPr>
-          <p:nvPr>
-            <p:ph type="title"/>
-          </p:nvPr>
-        </p:nvSpPr>
-        <p:spPr/>
-        <p:txBody>
-          <a:bodyPr>
-            <a:normAutofit/>
-          </a:bodyPr>
-          <a:lstStyle/>
-          <a:p>
-            <a:r>
-              <a:rPr lang="en-US" dirty="0" smtClean="0">
-                <a:solidFill>
-                  <a:srgbClr val="A8C6D0"/>
-                </a:solidFill>
-              </a:rPr>
-              <a:t>State</a:t>
-            </a:r>
-            <a:endParaRPr lang="en-US" dirty="0">
-              <a:solidFill>
-                <a:srgbClr val="A8C6D0"/>
-              </a:solidFill>
-            </a:endParaRPr>
-          </a:p>
-        </p:txBody>
-      </p:sp>
-    </p:spTree>
-    <p:extLst>
-      <p:ext uri="{BB962C8B-B14F-4D97-AF65-F5344CB8AC3E}">
-        <p14:creationId xmlns:p14="http://schemas.microsoft.com/office/powerpoint/2010/main" val="2501490412"/>
-      </p:ext>
-    </p:extLst>
-  </p:cSld>
-  <p:clrMapOvr>
-    <a:masterClrMapping/>
-  </p:clrMapOvr>
-  <p:timing>
-    <p:tnLst>
-      <p:par>
-        <p:cTn xmlns:p14="http://schemas.microsoft.com/office/powerpoint/2010/main" id="1" dur="indefinite" restart="never" nodeType="tmRoot"/>
-      </p:par>
-    </p:tnLst>
-  </p:timing>
-</p:sld>
-</file>
-
-<file path=ppt/slides/slide9.xml><?xml version="1.0" encoding="utf-8"?>
-<p:sld xmlns:a="http://schemas.openxmlformats.org/drawingml/2006/main" xmlns:r="http://schemas.openxmlformats.org/officeDocument/2006/relationships" xmlns:p="http://schemas.openxmlformats.org/presentationml/2006/main">
-  <p:cSld>
-    <p:spTree>
-      <p:nvGrpSpPr>
-        <p:cNvPr id="1" name=""/>
-        <p:cNvGrpSpPr/>
-        <p:nvPr/>
-      </p:nvGrpSpPr>
-      <p:grpSpPr>
-        <a:xfrm>
-          <a:off x="0" y="0"/>
-          <a:ext cx="0" cy="0"/>
-          <a:chOff x="0" y="0"/>
-          <a:chExt cx="0" cy="0"/>
-        </a:xfrm>
-      </p:grpSpPr>
-      <p:sp>
-        <p:nvSpPr>
-          <p:cNvPr id="2" name="Title 1"/>
-          <p:cNvSpPr>
-            <a:spLocks noGrp="1"/>
-          </p:cNvSpPr>
-          <p:nvPr>
-            <p:ph type="title"/>
-          </p:nvPr>
-        </p:nvSpPr>
-        <p:spPr/>
-        <p:txBody>
-          <a:bodyPr>
-            <a:normAutofit/>
-          </a:bodyPr>
-          <a:lstStyle/>
-          <a:p>
-            <a:r>
-              <a:rPr lang="en-US" dirty="0" smtClean="0">
-                <a:solidFill>
-                  <a:srgbClr val="A8C6D0"/>
-                </a:solidFill>
-              </a:rPr>
-              <a:t>State</a:t>
-            </a:r>
-            <a:endParaRPr lang="en-US" dirty="0">
-              <a:solidFill>
-                <a:srgbClr val="A8C6D0"/>
-              </a:solidFill>
-            </a:endParaRPr>
-          </a:p>
-        </p:txBody>
-      </p:sp>
-    </p:spTree>
-    <p:extLst>
-      <p:ext uri="{BB962C8B-B14F-4D97-AF65-F5344CB8AC3E}">
-        <p14:creationId xmlns:p14="http://schemas.microsoft.com/office/powerpoint/2010/main" val="3905872089"/>
       </p:ext>
     </p:extLst>
   </p:cSld>

</xml_diff>

<commit_message>
Added second version of functions on FSharp. Added instructions of steps to take on binding and assignment inside the presentation cheat sheet. created the binding and assignment on elixir.
</commit_message>
<xml_diff>
--- a/IntoAdventure.pptx
+++ b/IntoAdventure.pptx
@@ -4988,9 +4988,303 @@
   <p:timing>
     <p:tnLst>
       <p:par>
-        <p:cTn xmlns:p14="http://schemas.microsoft.com/office/powerpoint/2010/main" id="1" dur="indefinite" restart="never" nodeType="tmRoot"/>
+        <p:cTn xmlns:p14="http://schemas.microsoft.com/office/powerpoint/2010/main" id="1" dur="indefinite" restart="never" nodeType="tmRoot">
+          <p:childTnLst>
+            <p:seq concurrent="1" nextAc="seek">
+              <p:cTn id="2" dur="indefinite" nodeType="mainSeq">
+                <p:childTnLst>
+                  <p:par>
+                    <p:cTn id="3" fill="hold">
+                      <p:stCondLst>
+                        <p:cond delay="indefinite"/>
+                      </p:stCondLst>
+                      <p:childTnLst>
+                        <p:par>
+                          <p:cTn id="4" fill="hold">
+                            <p:stCondLst>
+                              <p:cond delay="0"/>
+                            </p:stCondLst>
+                            <p:childTnLst>
+                              <p:par>
+                                <p:cTn id="5" presetID="3" presetClass="entr" presetSubtype="10" fill="hold" nodeType="clickEffect">
+                                  <p:stCondLst>
+                                    <p:cond delay="0"/>
+                                  </p:stCondLst>
+                                  <p:childTnLst>
+                                    <p:set>
+                                      <p:cBhvr>
+                                        <p:cTn id="6" dur="1" fill="hold">
+                                          <p:stCondLst>
+                                            <p:cond delay="0"/>
+                                          </p:stCondLst>
+                                        </p:cTn>
+                                        <p:tgtEl>
+                                          <p:spTgt spid="4"/>
+                                        </p:tgtEl>
+                                        <p:attrNameLst>
+                                          <p:attrName>style.visibility</p:attrName>
+                                        </p:attrNameLst>
+                                      </p:cBhvr>
+                                      <p:to>
+                                        <p:strVal val="visible"/>
+                                      </p:to>
+                                    </p:set>
+                                    <p:animEffect transition="in" filter="blinds(horizontal)">
+                                      <p:cBhvr>
+                                        <p:cTn id="7" dur="500"/>
+                                        <p:tgtEl>
+                                          <p:spTgt spid="4"/>
+                                        </p:tgtEl>
+                                      </p:cBhvr>
+                                    </p:animEffect>
+                                  </p:childTnLst>
+                                </p:cTn>
+                              </p:par>
+                            </p:childTnLst>
+                          </p:cTn>
+                        </p:par>
+                      </p:childTnLst>
+                    </p:cTn>
+                  </p:par>
+                  <p:par>
+                    <p:cTn id="8" fill="hold">
+                      <p:stCondLst>
+                        <p:cond delay="indefinite"/>
+                      </p:stCondLst>
+                      <p:childTnLst>
+                        <p:par>
+                          <p:cTn id="9" fill="hold">
+                            <p:stCondLst>
+                              <p:cond delay="0"/>
+                            </p:stCondLst>
+                            <p:childTnLst>
+                              <p:par>
+                                <p:cTn id="10" presetID="3" presetClass="entr" presetSubtype="10" fill="hold" grpId="0" nodeType="clickEffect">
+                                  <p:stCondLst>
+                                    <p:cond delay="0"/>
+                                  </p:stCondLst>
+                                  <p:childTnLst>
+                                    <p:set>
+                                      <p:cBhvr>
+                                        <p:cTn id="11" dur="1" fill="hold">
+                                          <p:stCondLst>
+                                            <p:cond delay="0"/>
+                                          </p:stCondLst>
+                                        </p:cTn>
+                                        <p:tgtEl>
+                                          <p:spTgt spid="3"/>
+                                        </p:tgtEl>
+                                        <p:attrNameLst>
+                                          <p:attrName>style.visibility</p:attrName>
+                                        </p:attrNameLst>
+                                      </p:cBhvr>
+                                      <p:to>
+                                        <p:strVal val="visible"/>
+                                      </p:to>
+                                    </p:set>
+                                    <p:animEffect transition="in" filter="blinds(horizontal)">
+                                      <p:cBhvr>
+                                        <p:cTn id="12" dur="500"/>
+                                        <p:tgtEl>
+                                          <p:spTgt spid="3"/>
+                                        </p:tgtEl>
+                                      </p:cBhvr>
+                                    </p:animEffect>
+                                  </p:childTnLst>
+                                </p:cTn>
+                              </p:par>
+                            </p:childTnLst>
+                          </p:cTn>
+                        </p:par>
+                      </p:childTnLst>
+                    </p:cTn>
+                  </p:par>
+                  <p:par>
+                    <p:cTn id="13" fill="hold">
+                      <p:stCondLst>
+                        <p:cond delay="indefinite"/>
+                      </p:stCondLst>
+                      <p:childTnLst>
+                        <p:par>
+                          <p:cTn id="14" fill="hold">
+                            <p:stCondLst>
+                              <p:cond delay="0"/>
+                            </p:stCondLst>
+                            <p:childTnLst>
+                              <p:par>
+                                <p:cTn id="15" presetID="3" presetClass="entr" presetSubtype="10" fill="hold" grpId="0" nodeType="clickEffect">
+                                  <p:stCondLst>
+                                    <p:cond delay="0"/>
+                                  </p:stCondLst>
+                                  <p:childTnLst>
+                                    <p:set>
+                                      <p:cBhvr>
+                                        <p:cTn id="16" dur="1" fill="hold">
+                                          <p:stCondLst>
+                                            <p:cond delay="0"/>
+                                          </p:stCondLst>
+                                        </p:cTn>
+                                        <p:tgtEl>
+                                          <p:spTgt spid="5"/>
+                                        </p:tgtEl>
+                                        <p:attrNameLst>
+                                          <p:attrName>style.visibility</p:attrName>
+                                        </p:attrNameLst>
+                                      </p:cBhvr>
+                                      <p:to>
+                                        <p:strVal val="visible"/>
+                                      </p:to>
+                                    </p:set>
+                                    <p:animEffect transition="in" filter="blinds(horizontal)">
+                                      <p:cBhvr>
+                                        <p:cTn id="17" dur="500"/>
+                                        <p:tgtEl>
+                                          <p:spTgt spid="5"/>
+                                        </p:tgtEl>
+                                      </p:cBhvr>
+                                    </p:animEffect>
+                                  </p:childTnLst>
+                                </p:cTn>
+                              </p:par>
+                            </p:childTnLst>
+                          </p:cTn>
+                        </p:par>
+                      </p:childTnLst>
+                    </p:cTn>
+                  </p:par>
+                  <p:par>
+                    <p:cTn id="18" fill="hold">
+                      <p:stCondLst>
+                        <p:cond delay="indefinite"/>
+                      </p:stCondLst>
+                      <p:childTnLst>
+                        <p:par>
+                          <p:cTn id="19" fill="hold">
+                            <p:stCondLst>
+                              <p:cond delay="0"/>
+                            </p:stCondLst>
+                            <p:childTnLst>
+                              <p:par>
+                                <p:cTn id="20" presetID="3" presetClass="entr" presetSubtype="10" fill="hold" grpId="0" nodeType="clickEffect">
+                                  <p:stCondLst>
+                                    <p:cond delay="0"/>
+                                  </p:stCondLst>
+                                  <p:childTnLst>
+                                    <p:set>
+                                      <p:cBhvr>
+                                        <p:cTn id="21" dur="1" fill="hold">
+                                          <p:stCondLst>
+                                            <p:cond delay="0"/>
+                                          </p:stCondLst>
+                                        </p:cTn>
+                                        <p:tgtEl>
+                                          <p:spTgt spid="6"/>
+                                        </p:tgtEl>
+                                        <p:attrNameLst>
+                                          <p:attrName>style.visibility</p:attrName>
+                                        </p:attrNameLst>
+                                      </p:cBhvr>
+                                      <p:to>
+                                        <p:strVal val="visible"/>
+                                      </p:to>
+                                    </p:set>
+                                    <p:animEffect transition="in" filter="blinds(horizontal)">
+                                      <p:cBhvr>
+                                        <p:cTn id="22" dur="500"/>
+                                        <p:tgtEl>
+                                          <p:spTgt spid="6"/>
+                                        </p:tgtEl>
+                                      </p:cBhvr>
+                                    </p:animEffect>
+                                  </p:childTnLst>
+                                </p:cTn>
+                              </p:par>
+                            </p:childTnLst>
+                          </p:cTn>
+                        </p:par>
+                      </p:childTnLst>
+                    </p:cTn>
+                  </p:par>
+                  <p:par>
+                    <p:cTn id="23" fill="hold">
+                      <p:stCondLst>
+                        <p:cond delay="indefinite"/>
+                      </p:stCondLst>
+                      <p:childTnLst>
+                        <p:par>
+                          <p:cTn id="24" fill="hold">
+                            <p:stCondLst>
+                              <p:cond delay="0"/>
+                            </p:stCondLst>
+                            <p:childTnLst>
+                              <p:par>
+                                <p:cTn id="25" presetID="3" presetClass="entr" presetSubtype="10" fill="hold" grpId="0" nodeType="clickEffect">
+                                  <p:stCondLst>
+                                    <p:cond delay="0"/>
+                                  </p:stCondLst>
+                                  <p:childTnLst>
+                                    <p:set>
+                                      <p:cBhvr>
+                                        <p:cTn id="26" dur="1" fill="hold">
+                                          <p:stCondLst>
+                                            <p:cond delay="0"/>
+                                          </p:stCondLst>
+                                        </p:cTn>
+                                        <p:tgtEl>
+                                          <p:spTgt spid="7"/>
+                                        </p:tgtEl>
+                                        <p:attrNameLst>
+                                          <p:attrName>style.visibility</p:attrName>
+                                        </p:attrNameLst>
+                                      </p:cBhvr>
+                                      <p:to>
+                                        <p:strVal val="visible"/>
+                                      </p:to>
+                                    </p:set>
+                                    <p:animEffect transition="in" filter="blinds(horizontal)">
+                                      <p:cBhvr>
+                                        <p:cTn id="27" dur="500"/>
+                                        <p:tgtEl>
+                                          <p:spTgt spid="7"/>
+                                        </p:tgtEl>
+                                      </p:cBhvr>
+                                    </p:animEffect>
+                                  </p:childTnLst>
+                                </p:cTn>
+                              </p:par>
+                            </p:childTnLst>
+                          </p:cTn>
+                        </p:par>
+                      </p:childTnLst>
+                    </p:cTn>
+                  </p:par>
+                </p:childTnLst>
+              </p:cTn>
+              <p:prevCondLst>
+                <p:cond evt="onPrev" delay="0">
+                  <p:tgtEl>
+                    <p:sldTgt/>
+                  </p:tgtEl>
+                </p:cond>
+              </p:prevCondLst>
+              <p:nextCondLst>
+                <p:cond evt="onNext" delay="0">
+                  <p:tgtEl>
+                    <p:sldTgt/>
+                  </p:tgtEl>
+                </p:cond>
+              </p:nextCondLst>
+            </p:seq>
+          </p:childTnLst>
+        </p:cTn>
       </p:par>
     </p:tnLst>
+    <p:bldLst>
+      <p:bldP spid="5" grpId="0"/>
+      <p:bldP spid="3" grpId="0"/>
+      <p:bldP spid="6" grpId="0"/>
+      <p:bldP spid="7" grpId="0"/>
+    </p:bldLst>
   </p:timing>
 </p:sld>
 </file>
@@ -5159,7 +5453,7 @@
         </p:nvSpPr>
         <p:spPr>
           <a:xfrm>
-            <a:off x="467719" y="4338765"/>
+            <a:off x="457200" y="4600375"/>
             <a:ext cx="1700556" cy="523220"/>
           </a:xfrm>
           <a:prstGeom prst="rect">
@@ -5379,7 +5673,7 @@
         </p:nvSpPr>
         <p:spPr>
           <a:xfrm>
-            <a:off x="1032650" y="1649956"/>
+            <a:off x="1661737" y="1554529"/>
             <a:ext cx="5010056" cy="523220"/>
           </a:xfrm>
           <a:prstGeom prst="rect">
@@ -5429,7 +5723,7 @@
         </p:nvSpPr>
         <p:spPr>
           <a:xfrm>
-            <a:off x="6267119" y="2492739"/>
+            <a:off x="5552377" y="4807891"/>
             <a:ext cx="980657" cy="523220"/>
           </a:xfrm>
           <a:prstGeom prst="rect">
@@ -5465,7 +5759,7 @@
         </p:nvSpPr>
         <p:spPr>
           <a:xfrm>
-            <a:off x="913955" y="4475060"/>
+            <a:off x="1981425" y="4807891"/>
             <a:ext cx="1506818" cy="523220"/>
           </a:xfrm>
           <a:prstGeom prst="rect">
@@ -5501,7 +5795,7 @@
         </p:nvSpPr>
         <p:spPr>
           <a:xfrm>
-            <a:off x="5590555" y="4475060"/>
+            <a:off x="249260" y="2907262"/>
             <a:ext cx="2787943" cy="523220"/>
           </a:xfrm>
           <a:prstGeom prst="rect">
@@ -5531,49 +5825,13 @@
       </p:sp>
       <p:sp>
         <p:nvSpPr>
-          <p:cNvPr id="9" name="TextBox 8"/>
-          <p:cNvSpPr txBox="1"/>
-          <p:nvPr/>
-        </p:nvSpPr>
-        <p:spPr>
-          <a:xfrm>
-            <a:off x="522260" y="2907729"/>
-            <a:ext cx="2510573" cy="523220"/>
-          </a:xfrm>
-          <a:prstGeom prst="rect">
-            <a:avLst/>
-          </a:prstGeom>
-          <a:noFill/>
-        </p:spPr>
-        <p:txBody>
-          <a:bodyPr wrap="none" rtlCol="0">
-            <a:spAutoFit/>
-          </a:bodyPr>
-          <a:lstStyle/>
-          <a:p>
-            <a:r>
-              <a:rPr lang="en-US" sz="2800" dirty="0" smtClean="0">
-                <a:latin typeface="Franklin Gothic Book"/>
-                <a:cs typeface="Franklin Gothic Book"/>
-              </a:rPr>
-              <a:t>Lazy evaluation</a:t>
-            </a:r>
-            <a:endParaRPr lang="en-US" sz="2800" dirty="0">
-              <a:latin typeface="Franklin Gothic Book"/>
-              <a:cs typeface="Franklin Gothic Book"/>
-            </a:endParaRPr>
-          </a:p>
-        </p:txBody>
-      </p:sp>
-      <p:sp>
-        <p:nvSpPr>
           <p:cNvPr id="10" name="TextBox 9"/>
           <p:cNvSpPr txBox="1"/>
           <p:nvPr/>
         </p:nvSpPr>
         <p:spPr>
           <a:xfrm>
-            <a:off x="2538780" y="5316487"/>
+            <a:off x="5291663" y="2907262"/>
             <a:ext cx="3852337" cy="523220"/>
           </a:xfrm>
           <a:prstGeom prst="rect">

</xml_diff>

<commit_message>
Added some animations and some colours
</commit_message>
<xml_diff>
--- a/IntoAdventure.pptx
+++ b/IntoAdventure.pptx
@@ -4945,8 +4945,8 @@
         </p:nvSpPr>
         <p:spPr>
           <a:xfrm>
-            <a:off x="4379862" y="1649956"/>
-            <a:ext cx="2493666" cy="369332"/>
+            <a:off x="4643422" y="1417638"/>
+            <a:ext cx="3672800" cy="369332"/>
           </a:xfrm>
           <a:prstGeom prst="rect">
             <a:avLst/>
@@ -4960,18 +4960,25 @@
           <a:lstStyle/>
           <a:p>
             <a:r>
-              <a:rPr lang="en-US" dirty="0" err="1" smtClean="0"/>
-              <a:t>GitHub</a:t>
-            </a:r>
-            <a:r>
-              <a:rPr lang="en-US" dirty="0" smtClean="0"/>
-              <a:t> </a:t>
-            </a:r>
-            <a:r>
-              <a:rPr lang="en-US" dirty="0" err="1" smtClean="0"/>
+              <a:rPr lang="en-US" dirty="0"/>
+              <a:t>https://</a:t>
+            </a:r>
+            <a:r>
+              <a:rPr lang="en-US" dirty="0" err="1"/>
+              <a:t>github.com</a:t>
+            </a:r>
+            <a:r>
+              <a:rPr lang="en-US" dirty="0"/>
+              <a:t>/</a:t>
+            </a:r>
+            <a:r>
+              <a:rPr lang="en-US" dirty="0" err="1"/>
               <a:t>MiyamotoAkira</a:t>
             </a:r>
-            <a:endParaRPr lang="en-US" dirty="0"/>
+            <a:r>
+              <a:rPr lang="en-US" dirty="0"/>
+              <a:t>/</a:t>
+            </a:r>
           </a:p>
         </p:txBody>
       </p:sp>
@@ -5361,12 +5368,18 @@
           <a:p>
             <a:r>
               <a:rPr lang="en-US" sz="2800" dirty="0" smtClean="0">
+                <a:solidFill>
+                  <a:srgbClr val="FFFF00"/>
+                </a:solidFill>
                 <a:latin typeface="Franklin Gothic Book"/>
                 <a:cs typeface="Franklin Gothic Book"/>
               </a:rPr>
               <a:t>For Yourself</a:t>
             </a:r>
             <a:endParaRPr lang="en-US" sz="2800" dirty="0">
+              <a:solidFill>
+                <a:srgbClr val="FFFF00"/>
+              </a:solidFill>
               <a:latin typeface="Franklin Gothic Book"/>
               <a:cs typeface="Franklin Gothic Book"/>
             </a:endParaRPr>
@@ -5397,12 +5410,18 @@
           <a:p>
             <a:r>
               <a:rPr lang="en-US" sz="2800" dirty="0" smtClean="0">
+                <a:solidFill>
+                  <a:srgbClr val="FF6600"/>
+                </a:solidFill>
                 <a:latin typeface="Franklin Gothic Book"/>
                 <a:cs typeface="Franklin Gothic Book"/>
               </a:rPr>
               <a:t>Terseness</a:t>
             </a:r>
             <a:endParaRPr lang="en-US" sz="2800" dirty="0">
+              <a:solidFill>
+                <a:srgbClr val="FF6600"/>
+              </a:solidFill>
               <a:latin typeface="Franklin Gothic Book"/>
               <a:cs typeface="Franklin Gothic Book"/>
             </a:endParaRPr>
@@ -5433,12 +5452,18 @@
           <a:p>
             <a:r>
               <a:rPr lang="en-US" sz="2800" dirty="0" smtClean="0">
+                <a:solidFill>
+                  <a:srgbClr val="FF6600"/>
+                </a:solidFill>
                 <a:latin typeface="Franklin Gothic Book"/>
                 <a:cs typeface="Franklin Gothic Book"/>
               </a:rPr>
               <a:t>Less code</a:t>
             </a:r>
             <a:endParaRPr lang="en-US" sz="2800" dirty="0">
+              <a:solidFill>
+                <a:srgbClr val="FF6600"/>
+              </a:solidFill>
               <a:latin typeface="Franklin Gothic Book"/>
               <a:cs typeface="Franklin Gothic Book"/>
             </a:endParaRPr>
@@ -5469,12 +5494,18 @@
           <a:p>
             <a:r>
               <a:rPr lang="en-US" sz="2800" dirty="0" smtClean="0">
+                <a:solidFill>
+                  <a:srgbClr val="FF6600"/>
+                </a:solidFill>
                 <a:latin typeface="Franklin Gothic Book"/>
                 <a:cs typeface="Franklin Gothic Book"/>
               </a:rPr>
               <a:t>Less bugs</a:t>
             </a:r>
             <a:endParaRPr lang="en-US" sz="2800" dirty="0">
+              <a:solidFill>
+                <a:srgbClr val="FF6600"/>
+              </a:solidFill>
               <a:latin typeface="Franklin Gothic Book"/>
               <a:cs typeface="Franklin Gothic Book"/>
             </a:endParaRPr>
@@ -5541,12 +5572,18 @@
           <a:p>
             <a:r>
               <a:rPr lang="en-US" sz="2800" dirty="0" smtClean="0">
+                <a:solidFill>
+                  <a:srgbClr val="B7F539"/>
+                </a:solidFill>
                 <a:latin typeface="Franklin Gothic Book"/>
                 <a:cs typeface="Franklin Gothic Book"/>
               </a:rPr>
               <a:t>Easier concurrency</a:t>
             </a:r>
             <a:endParaRPr lang="en-US" sz="2800" dirty="0">
+              <a:solidFill>
+                <a:srgbClr val="B7F539"/>
+              </a:solidFill>
               <a:latin typeface="Franklin Gothic Book"/>
               <a:cs typeface="Franklin Gothic Book"/>
             </a:endParaRPr>
@@ -5577,6 +5614,9 @@
           <a:p>
             <a:r>
               <a:rPr lang="en-US" sz="2800" dirty="0" smtClean="0">
+                <a:solidFill>
+                  <a:srgbClr val="B7F539"/>
+                </a:solidFill>
                 <a:latin typeface="Franklin Gothic Book"/>
                 <a:cs typeface="Franklin Gothic Book"/>
               </a:rPr>
@@ -5584,6 +5624,9 @@
             </a:r>
             <a:r>
               <a:rPr lang="en-US" sz="2800" dirty="0">
+                <a:solidFill>
+                  <a:srgbClr val="B7F539"/>
+                </a:solidFill>
                 <a:latin typeface="Franklin Gothic Book"/>
                 <a:cs typeface="Franklin Gothic Book"/>
               </a:rPr>
@@ -5605,9 +5648,541 @@
   <p:timing>
     <p:tnLst>
       <p:par>
-        <p:cTn xmlns:p14="http://schemas.microsoft.com/office/powerpoint/2010/main" id="1" dur="indefinite" restart="never" nodeType="tmRoot"/>
+        <p:cTn xmlns:p14="http://schemas.microsoft.com/office/powerpoint/2010/main" id="1" dur="indefinite" restart="never" nodeType="tmRoot">
+          <p:childTnLst>
+            <p:seq concurrent="1" nextAc="seek">
+              <p:cTn id="2" dur="indefinite" nodeType="mainSeq">
+                <p:childTnLst>
+                  <p:par>
+                    <p:cTn id="3" fill="hold">
+                      <p:stCondLst>
+                        <p:cond delay="indefinite"/>
+                      </p:stCondLst>
+                      <p:childTnLst>
+                        <p:par>
+                          <p:cTn id="4" fill="hold">
+                            <p:stCondLst>
+                              <p:cond delay="0"/>
+                            </p:stCondLst>
+                            <p:childTnLst>
+                              <p:par>
+                                <p:cTn id="5" presetID="2" presetClass="entr" presetSubtype="1" fill="hold" grpId="1" nodeType="clickEffect">
+                                  <p:stCondLst>
+                                    <p:cond delay="0"/>
+                                  </p:stCondLst>
+                                  <p:childTnLst>
+                                    <p:set>
+                                      <p:cBhvr>
+                                        <p:cTn id="6" dur="1" fill="hold">
+                                          <p:stCondLst>
+                                            <p:cond delay="0"/>
+                                          </p:stCondLst>
+                                        </p:cTn>
+                                        <p:tgtEl>
+                                          <p:spTgt spid="4"/>
+                                        </p:tgtEl>
+                                        <p:attrNameLst>
+                                          <p:attrName>style.visibility</p:attrName>
+                                        </p:attrNameLst>
+                                      </p:cBhvr>
+                                      <p:to>
+                                        <p:strVal val="visible"/>
+                                      </p:to>
+                                    </p:set>
+                                    <p:anim calcmode="lin" valueType="num">
+                                      <p:cBhvr additive="base">
+                                        <p:cTn id="7" dur="500" fill="hold"/>
+                                        <p:tgtEl>
+                                          <p:spTgt spid="4"/>
+                                        </p:tgtEl>
+                                        <p:attrNameLst>
+                                          <p:attrName>ppt_x</p:attrName>
+                                        </p:attrNameLst>
+                                      </p:cBhvr>
+                                      <p:tavLst>
+                                        <p:tav tm="0">
+                                          <p:val>
+                                            <p:strVal val="#ppt_x"/>
+                                          </p:val>
+                                        </p:tav>
+                                        <p:tav tm="100000">
+                                          <p:val>
+                                            <p:strVal val="#ppt_x"/>
+                                          </p:val>
+                                        </p:tav>
+                                      </p:tavLst>
+                                    </p:anim>
+                                    <p:anim calcmode="lin" valueType="num">
+                                      <p:cBhvr additive="base">
+                                        <p:cTn id="8" dur="500" fill="hold"/>
+                                        <p:tgtEl>
+                                          <p:spTgt spid="4"/>
+                                        </p:tgtEl>
+                                        <p:attrNameLst>
+                                          <p:attrName>ppt_y</p:attrName>
+                                        </p:attrNameLst>
+                                      </p:cBhvr>
+                                      <p:tavLst>
+                                        <p:tav tm="0">
+                                          <p:val>
+                                            <p:strVal val="0-#ppt_h/2"/>
+                                          </p:val>
+                                        </p:tav>
+                                        <p:tav tm="100000">
+                                          <p:val>
+                                            <p:strVal val="#ppt_y"/>
+                                          </p:val>
+                                        </p:tav>
+                                      </p:tavLst>
+                                    </p:anim>
+                                  </p:childTnLst>
+                                </p:cTn>
+                              </p:par>
+                            </p:childTnLst>
+                          </p:cTn>
+                        </p:par>
+                      </p:childTnLst>
+                    </p:cTn>
+                  </p:par>
+                  <p:par>
+                    <p:cTn id="9" fill="hold">
+                      <p:stCondLst>
+                        <p:cond delay="indefinite"/>
+                      </p:stCondLst>
+                      <p:childTnLst>
+                        <p:par>
+                          <p:cTn id="10" fill="hold">
+                            <p:stCondLst>
+                              <p:cond delay="0"/>
+                            </p:stCondLst>
+                            <p:childTnLst>
+                              <p:par>
+                                <p:cTn id="11" presetID="9" presetClass="entr" presetSubtype="0" fill="hold" nodeType="clickEffect">
+                                  <p:stCondLst>
+                                    <p:cond delay="0"/>
+                                  </p:stCondLst>
+                                  <p:childTnLst>
+                                    <p:set>
+                                      <p:cBhvr>
+                                        <p:cTn id="12" dur="1" fill="hold">
+                                          <p:stCondLst>
+                                            <p:cond delay="0"/>
+                                          </p:stCondLst>
+                                        </p:cTn>
+                                        <p:tgtEl>
+                                          <p:spTgt spid="5">
+                                            <p:txEl>
+                                              <p:pRg st="0" end="0"/>
+                                            </p:txEl>
+                                          </p:spTgt>
+                                        </p:tgtEl>
+                                        <p:attrNameLst>
+                                          <p:attrName>style.visibility</p:attrName>
+                                        </p:attrNameLst>
+                                      </p:cBhvr>
+                                      <p:to>
+                                        <p:strVal val="visible"/>
+                                      </p:to>
+                                    </p:set>
+                                    <p:animEffect transition="in" filter="dissolve">
+                                      <p:cBhvr>
+                                        <p:cTn id="13" dur="500"/>
+                                        <p:tgtEl>
+                                          <p:spTgt spid="5">
+                                            <p:txEl>
+                                              <p:pRg st="0" end="0"/>
+                                            </p:txEl>
+                                          </p:spTgt>
+                                        </p:tgtEl>
+                                      </p:cBhvr>
+                                    </p:animEffect>
+                                  </p:childTnLst>
+                                </p:cTn>
+                              </p:par>
+                            </p:childTnLst>
+                          </p:cTn>
+                        </p:par>
+                      </p:childTnLst>
+                    </p:cTn>
+                  </p:par>
+                  <p:par>
+                    <p:cTn id="14" fill="hold">
+                      <p:stCondLst>
+                        <p:cond delay="indefinite"/>
+                      </p:stCondLst>
+                      <p:childTnLst>
+                        <p:par>
+                          <p:cTn id="15" fill="hold">
+                            <p:stCondLst>
+                              <p:cond delay="0"/>
+                            </p:stCondLst>
+                            <p:childTnLst>
+                              <p:par>
+                                <p:cTn id="16" presetID="9" presetClass="entr" presetSubtype="0" fill="hold" grpId="0" nodeType="clickEffect">
+                                  <p:stCondLst>
+                                    <p:cond delay="0"/>
+                                  </p:stCondLst>
+                                  <p:childTnLst>
+                                    <p:set>
+                                      <p:cBhvr>
+                                        <p:cTn id="17" dur="1" fill="hold">
+                                          <p:stCondLst>
+                                            <p:cond delay="0"/>
+                                          </p:stCondLst>
+                                        </p:cTn>
+                                        <p:tgtEl>
+                                          <p:spTgt spid="6"/>
+                                        </p:tgtEl>
+                                        <p:attrNameLst>
+                                          <p:attrName>style.visibility</p:attrName>
+                                        </p:attrNameLst>
+                                      </p:cBhvr>
+                                      <p:to>
+                                        <p:strVal val="visible"/>
+                                      </p:to>
+                                    </p:set>
+                                    <p:animEffect transition="in" filter="dissolve">
+                                      <p:cBhvr>
+                                        <p:cTn id="18" dur="500"/>
+                                        <p:tgtEl>
+                                          <p:spTgt spid="6"/>
+                                        </p:tgtEl>
+                                      </p:cBhvr>
+                                    </p:animEffect>
+                                  </p:childTnLst>
+                                </p:cTn>
+                              </p:par>
+                            </p:childTnLst>
+                          </p:cTn>
+                        </p:par>
+                      </p:childTnLst>
+                    </p:cTn>
+                  </p:par>
+                  <p:par>
+                    <p:cTn id="19" fill="hold">
+                      <p:stCondLst>
+                        <p:cond delay="indefinite"/>
+                      </p:stCondLst>
+                      <p:childTnLst>
+                        <p:par>
+                          <p:cTn id="20" fill="hold">
+                            <p:stCondLst>
+                              <p:cond delay="0"/>
+                            </p:stCondLst>
+                            <p:childTnLst>
+                              <p:par>
+                                <p:cTn id="21" presetID="9" presetClass="entr" presetSubtype="0" fill="hold" grpId="0" nodeType="clickEffect">
+                                  <p:stCondLst>
+                                    <p:cond delay="0"/>
+                                  </p:stCondLst>
+                                  <p:childTnLst>
+                                    <p:set>
+                                      <p:cBhvr>
+                                        <p:cTn id="22" dur="1" fill="hold">
+                                          <p:stCondLst>
+                                            <p:cond delay="0"/>
+                                          </p:stCondLst>
+                                        </p:cTn>
+                                        <p:tgtEl>
+                                          <p:spTgt spid="7"/>
+                                        </p:tgtEl>
+                                        <p:attrNameLst>
+                                          <p:attrName>style.visibility</p:attrName>
+                                        </p:attrNameLst>
+                                      </p:cBhvr>
+                                      <p:to>
+                                        <p:strVal val="visible"/>
+                                      </p:to>
+                                    </p:set>
+                                    <p:animEffect transition="in" filter="dissolve">
+                                      <p:cBhvr>
+                                        <p:cTn id="23" dur="500"/>
+                                        <p:tgtEl>
+                                          <p:spTgt spid="7"/>
+                                        </p:tgtEl>
+                                      </p:cBhvr>
+                                    </p:animEffect>
+                                  </p:childTnLst>
+                                </p:cTn>
+                              </p:par>
+                            </p:childTnLst>
+                          </p:cTn>
+                        </p:par>
+                      </p:childTnLst>
+                    </p:cTn>
+                  </p:par>
+                  <p:par>
+                    <p:cTn id="24" fill="hold">
+                      <p:stCondLst>
+                        <p:cond delay="indefinite"/>
+                      </p:stCondLst>
+                      <p:childTnLst>
+                        <p:par>
+                          <p:cTn id="25" fill="hold">
+                            <p:stCondLst>
+                              <p:cond delay="0"/>
+                            </p:stCondLst>
+                            <p:childTnLst>
+                              <p:par>
+                                <p:cTn id="26" presetID="12" presetClass="entr" presetSubtype="2" fill="hold" grpId="0" nodeType="clickEffect">
+                                  <p:stCondLst>
+                                    <p:cond delay="0"/>
+                                  </p:stCondLst>
+                                  <p:childTnLst>
+                                    <p:set>
+                                      <p:cBhvr>
+                                        <p:cTn id="27" dur="1" fill="hold">
+                                          <p:stCondLst>
+                                            <p:cond delay="0"/>
+                                          </p:stCondLst>
+                                        </p:cTn>
+                                        <p:tgtEl>
+                                          <p:spTgt spid="9"/>
+                                        </p:tgtEl>
+                                        <p:attrNameLst>
+                                          <p:attrName>style.visibility</p:attrName>
+                                        </p:attrNameLst>
+                                      </p:cBhvr>
+                                      <p:to>
+                                        <p:strVal val="visible"/>
+                                      </p:to>
+                                    </p:set>
+                                    <p:anim calcmode="lin" valueType="num">
+                                      <p:cBhvr additive="base">
+                                        <p:cTn id="28" dur="500"/>
+                                        <p:tgtEl>
+                                          <p:spTgt spid="9"/>
+                                        </p:tgtEl>
+                                        <p:attrNameLst>
+                                          <p:attrName>ppt_x</p:attrName>
+                                        </p:attrNameLst>
+                                      </p:cBhvr>
+                                      <p:tavLst>
+                                        <p:tav tm="0">
+                                          <p:val>
+                                            <p:strVal val="#ppt_x+#ppt_w*1.125000"/>
+                                          </p:val>
+                                        </p:tav>
+                                        <p:tav tm="100000">
+                                          <p:val>
+                                            <p:strVal val="#ppt_x"/>
+                                          </p:val>
+                                        </p:tav>
+                                      </p:tavLst>
+                                    </p:anim>
+                                    <p:animEffect transition="in" filter="wipe(left)">
+                                      <p:cBhvr>
+                                        <p:cTn id="29" dur="500"/>
+                                        <p:tgtEl>
+                                          <p:spTgt spid="9"/>
+                                        </p:tgtEl>
+                                      </p:cBhvr>
+                                    </p:animEffect>
+                                  </p:childTnLst>
+                                </p:cTn>
+                              </p:par>
+                            </p:childTnLst>
+                          </p:cTn>
+                        </p:par>
+                      </p:childTnLst>
+                    </p:cTn>
+                  </p:par>
+                  <p:par>
+                    <p:cTn id="30" fill="hold">
+                      <p:stCondLst>
+                        <p:cond delay="indefinite"/>
+                      </p:stCondLst>
+                      <p:childTnLst>
+                        <p:par>
+                          <p:cTn id="31" fill="hold">
+                            <p:stCondLst>
+                              <p:cond delay="0"/>
+                            </p:stCondLst>
+                            <p:childTnLst>
+                              <p:par>
+                                <p:cTn id="32" presetID="12" presetClass="entr" presetSubtype="2" fill="hold" grpId="0" nodeType="clickEffect">
+                                  <p:stCondLst>
+                                    <p:cond delay="0"/>
+                                  </p:stCondLst>
+                                  <p:childTnLst>
+                                    <p:set>
+                                      <p:cBhvr>
+                                        <p:cTn id="33" dur="1" fill="hold">
+                                          <p:stCondLst>
+                                            <p:cond delay="0"/>
+                                          </p:stCondLst>
+                                        </p:cTn>
+                                        <p:tgtEl>
+                                          <p:spTgt spid="10"/>
+                                        </p:tgtEl>
+                                        <p:attrNameLst>
+                                          <p:attrName>style.visibility</p:attrName>
+                                        </p:attrNameLst>
+                                      </p:cBhvr>
+                                      <p:to>
+                                        <p:strVal val="visible"/>
+                                      </p:to>
+                                    </p:set>
+                                    <p:anim calcmode="lin" valueType="num">
+                                      <p:cBhvr additive="base">
+                                        <p:cTn id="34" dur="500"/>
+                                        <p:tgtEl>
+                                          <p:spTgt spid="10"/>
+                                        </p:tgtEl>
+                                        <p:attrNameLst>
+                                          <p:attrName>ppt_x</p:attrName>
+                                        </p:attrNameLst>
+                                      </p:cBhvr>
+                                      <p:tavLst>
+                                        <p:tav tm="0">
+                                          <p:val>
+                                            <p:strVal val="#ppt_x+#ppt_w*1.125000"/>
+                                          </p:val>
+                                        </p:tav>
+                                        <p:tav tm="100000">
+                                          <p:val>
+                                            <p:strVal val="#ppt_x"/>
+                                          </p:val>
+                                        </p:tav>
+                                      </p:tavLst>
+                                    </p:anim>
+                                    <p:animEffect transition="in" filter="wipe(left)">
+                                      <p:cBhvr>
+                                        <p:cTn id="35" dur="500"/>
+                                        <p:tgtEl>
+                                          <p:spTgt spid="10"/>
+                                        </p:tgtEl>
+                                      </p:cBhvr>
+                                    </p:animEffect>
+                                  </p:childTnLst>
+                                </p:cTn>
+                              </p:par>
+                            </p:childTnLst>
+                          </p:cTn>
+                        </p:par>
+                      </p:childTnLst>
+                    </p:cTn>
+                  </p:par>
+                  <p:par>
+                    <p:cTn id="36" fill="hold">
+                      <p:stCondLst>
+                        <p:cond delay="indefinite"/>
+                      </p:stCondLst>
+                      <p:childTnLst>
+                        <p:par>
+                          <p:cTn id="37" fill="hold">
+                            <p:stCondLst>
+                              <p:cond delay="0"/>
+                            </p:stCondLst>
+                            <p:childTnLst>
+                              <p:par>
+                                <p:cTn id="38" presetID="2" presetClass="entr" presetSubtype="4" fill="hold" grpId="0" nodeType="clickEffect">
+                                  <p:stCondLst>
+                                    <p:cond delay="0"/>
+                                  </p:stCondLst>
+                                  <p:childTnLst>
+                                    <p:set>
+                                      <p:cBhvr>
+                                        <p:cTn id="39" dur="1" fill="hold">
+                                          <p:stCondLst>
+                                            <p:cond delay="0"/>
+                                          </p:stCondLst>
+                                        </p:cTn>
+                                        <p:tgtEl>
+                                          <p:spTgt spid="8"/>
+                                        </p:tgtEl>
+                                        <p:attrNameLst>
+                                          <p:attrName>style.visibility</p:attrName>
+                                        </p:attrNameLst>
+                                      </p:cBhvr>
+                                      <p:to>
+                                        <p:strVal val="visible"/>
+                                      </p:to>
+                                    </p:set>
+                                    <p:anim calcmode="lin" valueType="num">
+                                      <p:cBhvr additive="base">
+                                        <p:cTn id="40" dur="500" fill="hold"/>
+                                        <p:tgtEl>
+                                          <p:spTgt spid="8"/>
+                                        </p:tgtEl>
+                                        <p:attrNameLst>
+                                          <p:attrName>ppt_x</p:attrName>
+                                        </p:attrNameLst>
+                                      </p:cBhvr>
+                                      <p:tavLst>
+                                        <p:tav tm="0">
+                                          <p:val>
+                                            <p:strVal val="#ppt_x"/>
+                                          </p:val>
+                                        </p:tav>
+                                        <p:tav tm="100000">
+                                          <p:val>
+                                            <p:strVal val="#ppt_x"/>
+                                          </p:val>
+                                        </p:tav>
+                                      </p:tavLst>
+                                    </p:anim>
+                                    <p:anim calcmode="lin" valueType="num">
+                                      <p:cBhvr additive="base">
+                                        <p:cTn id="41" dur="500" fill="hold"/>
+                                        <p:tgtEl>
+                                          <p:spTgt spid="8"/>
+                                        </p:tgtEl>
+                                        <p:attrNameLst>
+                                          <p:attrName>ppt_y</p:attrName>
+                                        </p:attrNameLst>
+                                      </p:cBhvr>
+                                      <p:tavLst>
+                                        <p:tav tm="0">
+                                          <p:val>
+                                            <p:strVal val="1+#ppt_h/2"/>
+                                          </p:val>
+                                        </p:tav>
+                                        <p:tav tm="100000">
+                                          <p:val>
+                                            <p:strVal val="#ppt_y"/>
+                                          </p:val>
+                                        </p:tav>
+                                      </p:tavLst>
+                                    </p:anim>
+                                  </p:childTnLst>
+                                </p:cTn>
+                              </p:par>
+                            </p:childTnLst>
+                          </p:cTn>
+                        </p:par>
+                      </p:childTnLst>
+                    </p:cTn>
+                  </p:par>
+                </p:childTnLst>
+              </p:cTn>
+              <p:prevCondLst>
+                <p:cond evt="onPrev" delay="0">
+                  <p:tgtEl>
+                    <p:sldTgt/>
+                  </p:tgtEl>
+                </p:cond>
+              </p:prevCondLst>
+              <p:nextCondLst>
+                <p:cond evt="onNext" delay="0">
+                  <p:tgtEl>
+                    <p:sldTgt/>
+                  </p:tgtEl>
+                </p:cond>
+              </p:nextCondLst>
+            </p:seq>
+          </p:childTnLst>
+        </p:cTn>
       </p:par>
     </p:tnLst>
+    <p:bldLst>
+      <p:bldP spid="4" grpId="1"/>
+      <p:bldP spid="6" grpId="0"/>
+      <p:bldP spid="7" grpId="0"/>
+      <p:bldP spid="8" grpId="0"/>
+      <p:bldP spid="9" grpId="0"/>
+      <p:bldP spid="10" grpId="0"/>
+    </p:bldLst>
   </p:timing>
 </p:sld>
 </file>
@@ -5638,7 +6213,7 @@
         <p:spPr>
           <a:xfrm>
             <a:off x="3654417" y="3169339"/>
-            <a:ext cx="1166706" cy="523220"/>
+            <a:ext cx="1443624" cy="646331"/>
           </a:xfrm>
           <a:prstGeom prst="rect">
             <a:avLst/>
@@ -5652,13 +6227,101 @@
           <a:lstStyle/>
           <a:p>
             <a:r>
-              <a:rPr lang="en-US" sz="2800" dirty="0" smtClean="0">
+              <a:rPr lang="en-US" sz="3600" b="1" dirty="0" smtClean="0">
+                <a:ln w="10541" cmpd="sng">
+                  <a:solidFill>
+                    <a:schemeClr val="accent1">
+                      <a:shade val="88000"/>
+                      <a:satMod val="110000"/>
+                    </a:schemeClr>
+                  </a:solidFill>
+                  <a:prstDash val="solid"/>
+                </a:ln>
+                <a:gradFill>
+                  <a:gsLst>
+                    <a:gs pos="0">
+                      <a:schemeClr val="accent1">
+                        <a:tint val="40000"/>
+                        <a:satMod val="250000"/>
+                      </a:schemeClr>
+                    </a:gs>
+                    <a:gs pos="9000">
+                      <a:schemeClr val="accent1">
+                        <a:tint val="52000"/>
+                        <a:satMod val="300000"/>
+                      </a:schemeClr>
+                    </a:gs>
+                    <a:gs pos="50000">
+                      <a:schemeClr val="accent1">
+                        <a:shade val="20000"/>
+                        <a:satMod val="300000"/>
+                      </a:schemeClr>
+                    </a:gs>
+                    <a:gs pos="79000">
+                      <a:schemeClr val="accent1">
+                        <a:tint val="52000"/>
+                        <a:satMod val="300000"/>
+                      </a:schemeClr>
+                    </a:gs>
+                    <a:gs pos="100000">
+                      <a:schemeClr val="accent1">
+                        <a:tint val="40000"/>
+                        <a:satMod val="250000"/>
+                      </a:schemeClr>
+                    </a:gs>
+                  </a:gsLst>
+                  <a:lin ang="5400000"/>
+                </a:gradFill>
                 <a:latin typeface="Franklin Gothic Book"/>
                 <a:cs typeface="Franklin Gothic Book"/>
               </a:rPr>
               <a:t>What?</a:t>
             </a:r>
-            <a:endParaRPr lang="en-US" sz="2800" dirty="0">
+            <a:endParaRPr lang="en-US" sz="3600" b="1" dirty="0">
+              <a:ln w="10541" cmpd="sng">
+                <a:solidFill>
+                  <a:schemeClr val="accent1">
+                    <a:shade val="88000"/>
+                    <a:satMod val="110000"/>
+                  </a:schemeClr>
+                </a:solidFill>
+                <a:prstDash val="solid"/>
+              </a:ln>
+              <a:gradFill>
+                <a:gsLst>
+                  <a:gs pos="0">
+                    <a:schemeClr val="accent1">
+                      <a:tint val="40000"/>
+                      <a:satMod val="250000"/>
+                    </a:schemeClr>
+                  </a:gs>
+                  <a:gs pos="9000">
+                    <a:schemeClr val="accent1">
+                      <a:tint val="52000"/>
+                      <a:satMod val="300000"/>
+                    </a:schemeClr>
+                  </a:gs>
+                  <a:gs pos="50000">
+                    <a:schemeClr val="accent1">
+                      <a:shade val="20000"/>
+                      <a:satMod val="300000"/>
+                    </a:schemeClr>
+                  </a:gs>
+                  <a:gs pos="79000">
+                    <a:schemeClr val="accent1">
+                      <a:tint val="52000"/>
+                      <a:satMod val="300000"/>
+                    </a:schemeClr>
+                  </a:gs>
+                  <a:gs pos="100000">
+                    <a:schemeClr val="accent1">
+                      <a:tint val="40000"/>
+                      <a:satMod val="250000"/>
+                    </a:schemeClr>
+                  </a:gs>
+                </a:gsLst>
+                <a:lin ang="5400000"/>
+              </a:gradFill>
               <a:latin typeface="Franklin Gothic Book"/>
               <a:cs typeface="Franklin Gothic Book"/>
             </a:endParaRPr>
@@ -5872,9 +6535,434 @@
   <p:timing>
     <p:tnLst>
       <p:par>
-        <p:cTn xmlns:p14="http://schemas.microsoft.com/office/powerpoint/2010/main" id="1" dur="indefinite" restart="never" nodeType="tmRoot"/>
+        <p:cTn xmlns:p14="http://schemas.microsoft.com/office/powerpoint/2010/main" id="1" dur="indefinite" restart="never" nodeType="tmRoot">
+          <p:childTnLst>
+            <p:seq concurrent="1" nextAc="seek">
+              <p:cTn id="2" dur="indefinite" nodeType="mainSeq">
+                <p:childTnLst>
+                  <p:par>
+                    <p:cTn id="3" fill="hold">
+                      <p:stCondLst>
+                        <p:cond delay="indefinite"/>
+                      </p:stCondLst>
+                      <p:childTnLst>
+                        <p:par>
+                          <p:cTn id="4" fill="hold">
+                            <p:stCondLst>
+                              <p:cond delay="0"/>
+                            </p:stCondLst>
+                            <p:childTnLst>
+                              <p:par>
+                                <p:cTn id="5" presetID="2" presetClass="entr" presetSubtype="1" fill="hold" grpId="0" nodeType="clickEffect">
+                                  <p:stCondLst>
+                                    <p:cond delay="0"/>
+                                  </p:stCondLst>
+                                  <p:childTnLst>
+                                    <p:set>
+                                      <p:cBhvr>
+                                        <p:cTn id="6" dur="1" fill="hold">
+                                          <p:stCondLst>
+                                            <p:cond delay="0"/>
+                                          </p:stCondLst>
+                                        </p:cTn>
+                                        <p:tgtEl>
+                                          <p:spTgt spid="5"/>
+                                        </p:tgtEl>
+                                        <p:attrNameLst>
+                                          <p:attrName>style.visibility</p:attrName>
+                                        </p:attrNameLst>
+                                      </p:cBhvr>
+                                      <p:to>
+                                        <p:strVal val="visible"/>
+                                      </p:to>
+                                    </p:set>
+                                    <p:anim calcmode="lin" valueType="num">
+                                      <p:cBhvr additive="base">
+                                        <p:cTn id="7" dur="500" fill="hold"/>
+                                        <p:tgtEl>
+                                          <p:spTgt spid="5"/>
+                                        </p:tgtEl>
+                                        <p:attrNameLst>
+                                          <p:attrName>ppt_x</p:attrName>
+                                        </p:attrNameLst>
+                                      </p:cBhvr>
+                                      <p:tavLst>
+                                        <p:tav tm="0">
+                                          <p:val>
+                                            <p:strVal val="#ppt_x"/>
+                                          </p:val>
+                                        </p:tav>
+                                        <p:tav tm="100000">
+                                          <p:val>
+                                            <p:strVal val="#ppt_x"/>
+                                          </p:val>
+                                        </p:tav>
+                                      </p:tavLst>
+                                    </p:anim>
+                                    <p:anim calcmode="lin" valueType="num">
+                                      <p:cBhvr additive="base">
+                                        <p:cTn id="8" dur="500" fill="hold"/>
+                                        <p:tgtEl>
+                                          <p:spTgt spid="5"/>
+                                        </p:tgtEl>
+                                        <p:attrNameLst>
+                                          <p:attrName>ppt_y</p:attrName>
+                                        </p:attrNameLst>
+                                      </p:cBhvr>
+                                      <p:tavLst>
+                                        <p:tav tm="0">
+                                          <p:val>
+                                            <p:strVal val="0-#ppt_h/2"/>
+                                          </p:val>
+                                        </p:tav>
+                                        <p:tav tm="100000">
+                                          <p:val>
+                                            <p:strVal val="#ppt_y"/>
+                                          </p:val>
+                                        </p:tav>
+                                      </p:tavLst>
+                                    </p:anim>
+                                  </p:childTnLst>
+                                </p:cTn>
+                              </p:par>
+                            </p:childTnLst>
+                          </p:cTn>
+                        </p:par>
+                      </p:childTnLst>
+                    </p:cTn>
+                  </p:par>
+                  <p:par>
+                    <p:cTn id="9" fill="hold">
+                      <p:stCondLst>
+                        <p:cond delay="indefinite"/>
+                      </p:stCondLst>
+                      <p:childTnLst>
+                        <p:par>
+                          <p:cTn id="10" fill="hold">
+                            <p:stCondLst>
+                              <p:cond delay="0"/>
+                            </p:stCondLst>
+                            <p:childTnLst>
+                              <p:par>
+                                <p:cTn id="11" presetID="12" presetClass="entr" presetSubtype="2" fill="hold" grpId="0" nodeType="clickEffect">
+                                  <p:stCondLst>
+                                    <p:cond delay="0"/>
+                                  </p:stCondLst>
+                                  <p:childTnLst>
+                                    <p:set>
+                                      <p:cBhvr>
+                                        <p:cTn id="12" dur="1" fill="hold">
+                                          <p:stCondLst>
+                                            <p:cond delay="0"/>
+                                          </p:stCondLst>
+                                        </p:cTn>
+                                        <p:tgtEl>
+                                          <p:spTgt spid="10"/>
+                                        </p:tgtEl>
+                                        <p:attrNameLst>
+                                          <p:attrName>style.visibility</p:attrName>
+                                        </p:attrNameLst>
+                                      </p:cBhvr>
+                                      <p:to>
+                                        <p:strVal val="visible"/>
+                                      </p:to>
+                                    </p:set>
+                                    <p:anim calcmode="lin" valueType="num">
+                                      <p:cBhvr additive="base">
+                                        <p:cTn id="13" dur="500"/>
+                                        <p:tgtEl>
+                                          <p:spTgt spid="10"/>
+                                        </p:tgtEl>
+                                        <p:attrNameLst>
+                                          <p:attrName>ppt_x</p:attrName>
+                                        </p:attrNameLst>
+                                      </p:cBhvr>
+                                      <p:tavLst>
+                                        <p:tav tm="0">
+                                          <p:val>
+                                            <p:strVal val="#ppt_x+#ppt_w*1.125000"/>
+                                          </p:val>
+                                        </p:tav>
+                                        <p:tav tm="100000">
+                                          <p:val>
+                                            <p:strVal val="#ppt_x"/>
+                                          </p:val>
+                                        </p:tav>
+                                      </p:tavLst>
+                                    </p:anim>
+                                    <p:animEffect transition="in" filter="wipe(left)">
+                                      <p:cBhvr>
+                                        <p:cTn id="14" dur="500"/>
+                                        <p:tgtEl>
+                                          <p:spTgt spid="10"/>
+                                        </p:tgtEl>
+                                      </p:cBhvr>
+                                    </p:animEffect>
+                                  </p:childTnLst>
+                                </p:cTn>
+                              </p:par>
+                            </p:childTnLst>
+                          </p:cTn>
+                        </p:par>
+                      </p:childTnLst>
+                    </p:cTn>
+                  </p:par>
+                  <p:par>
+                    <p:cTn id="15" fill="hold">
+                      <p:stCondLst>
+                        <p:cond delay="indefinite"/>
+                      </p:stCondLst>
+                      <p:childTnLst>
+                        <p:par>
+                          <p:cTn id="16" fill="hold">
+                            <p:stCondLst>
+                              <p:cond delay="0"/>
+                            </p:stCondLst>
+                            <p:childTnLst>
+                              <p:par>
+                                <p:cTn id="17" presetID="12" presetClass="entr" presetSubtype="4" fill="hold" grpId="0" nodeType="clickEffect">
+                                  <p:stCondLst>
+                                    <p:cond delay="0"/>
+                                  </p:stCondLst>
+                                  <p:childTnLst>
+                                    <p:set>
+                                      <p:cBhvr>
+                                        <p:cTn id="18" dur="1" fill="hold">
+                                          <p:stCondLst>
+                                            <p:cond delay="0"/>
+                                          </p:stCondLst>
+                                        </p:cTn>
+                                        <p:tgtEl>
+                                          <p:spTgt spid="6"/>
+                                        </p:tgtEl>
+                                        <p:attrNameLst>
+                                          <p:attrName>style.visibility</p:attrName>
+                                        </p:attrNameLst>
+                                      </p:cBhvr>
+                                      <p:to>
+                                        <p:strVal val="visible"/>
+                                      </p:to>
+                                    </p:set>
+                                    <p:anim calcmode="lin" valueType="num">
+                                      <p:cBhvr additive="base">
+                                        <p:cTn id="19" dur="500"/>
+                                        <p:tgtEl>
+                                          <p:spTgt spid="6"/>
+                                        </p:tgtEl>
+                                        <p:attrNameLst>
+                                          <p:attrName>ppt_y</p:attrName>
+                                        </p:attrNameLst>
+                                      </p:cBhvr>
+                                      <p:tavLst>
+                                        <p:tav tm="0">
+                                          <p:val>
+                                            <p:strVal val="#ppt_y+#ppt_h*1.125000"/>
+                                          </p:val>
+                                        </p:tav>
+                                        <p:tav tm="100000">
+                                          <p:val>
+                                            <p:strVal val="#ppt_y"/>
+                                          </p:val>
+                                        </p:tav>
+                                      </p:tavLst>
+                                    </p:anim>
+                                    <p:animEffect transition="in" filter="wipe(up)">
+                                      <p:cBhvr>
+                                        <p:cTn id="20" dur="500"/>
+                                        <p:tgtEl>
+                                          <p:spTgt spid="6"/>
+                                        </p:tgtEl>
+                                      </p:cBhvr>
+                                    </p:animEffect>
+                                  </p:childTnLst>
+                                </p:cTn>
+                              </p:par>
+                            </p:childTnLst>
+                          </p:cTn>
+                        </p:par>
+                      </p:childTnLst>
+                    </p:cTn>
+                  </p:par>
+                  <p:par>
+                    <p:cTn id="21" fill="hold">
+                      <p:stCondLst>
+                        <p:cond delay="indefinite"/>
+                      </p:stCondLst>
+                      <p:childTnLst>
+                        <p:par>
+                          <p:cTn id="22" fill="hold">
+                            <p:stCondLst>
+                              <p:cond delay="0"/>
+                            </p:stCondLst>
+                            <p:childTnLst>
+                              <p:par>
+                                <p:cTn id="23" presetID="12" presetClass="entr" presetSubtype="4" fill="hold" grpId="0" nodeType="clickEffect">
+                                  <p:stCondLst>
+                                    <p:cond delay="0"/>
+                                  </p:stCondLst>
+                                  <p:childTnLst>
+                                    <p:set>
+                                      <p:cBhvr>
+                                        <p:cTn id="24" dur="1" fill="hold">
+                                          <p:stCondLst>
+                                            <p:cond delay="0"/>
+                                          </p:stCondLst>
+                                        </p:cTn>
+                                        <p:tgtEl>
+                                          <p:spTgt spid="7"/>
+                                        </p:tgtEl>
+                                        <p:attrNameLst>
+                                          <p:attrName>style.visibility</p:attrName>
+                                        </p:attrNameLst>
+                                      </p:cBhvr>
+                                      <p:to>
+                                        <p:strVal val="visible"/>
+                                      </p:to>
+                                    </p:set>
+                                    <p:anim calcmode="lin" valueType="num">
+                                      <p:cBhvr additive="base">
+                                        <p:cTn id="25" dur="500"/>
+                                        <p:tgtEl>
+                                          <p:spTgt spid="7"/>
+                                        </p:tgtEl>
+                                        <p:attrNameLst>
+                                          <p:attrName>ppt_y</p:attrName>
+                                        </p:attrNameLst>
+                                      </p:cBhvr>
+                                      <p:tavLst>
+                                        <p:tav tm="0">
+                                          <p:val>
+                                            <p:strVal val="#ppt_y+#ppt_h*1.125000"/>
+                                          </p:val>
+                                        </p:tav>
+                                        <p:tav tm="100000">
+                                          <p:val>
+                                            <p:strVal val="#ppt_y"/>
+                                          </p:val>
+                                        </p:tav>
+                                      </p:tavLst>
+                                    </p:anim>
+                                    <p:animEffect transition="in" filter="wipe(up)">
+                                      <p:cBhvr>
+                                        <p:cTn id="26" dur="500"/>
+                                        <p:tgtEl>
+                                          <p:spTgt spid="7"/>
+                                        </p:tgtEl>
+                                      </p:cBhvr>
+                                    </p:animEffect>
+                                  </p:childTnLst>
+                                </p:cTn>
+                              </p:par>
+                            </p:childTnLst>
+                          </p:cTn>
+                        </p:par>
+                      </p:childTnLst>
+                    </p:cTn>
+                  </p:par>
+                  <p:par>
+                    <p:cTn id="27" fill="hold">
+                      <p:stCondLst>
+                        <p:cond delay="indefinite"/>
+                      </p:stCondLst>
+                      <p:childTnLst>
+                        <p:par>
+                          <p:cTn id="28" fill="hold">
+                            <p:stCondLst>
+                              <p:cond delay="0"/>
+                            </p:stCondLst>
+                            <p:childTnLst>
+                              <p:par>
+                                <p:cTn id="29" presetID="12" presetClass="entr" presetSubtype="8" fill="hold" grpId="0" nodeType="clickEffect">
+                                  <p:stCondLst>
+                                    <p:cond delay="0"/>
+                                  </p:stCondLst>
+                                  <p:childTnLst>
+                                    <p:set>
+                                      <p:cBhvr>
+                                        <p:cTn id="30" dur="1" fill="hold">
+                                          <p:stCondLst>
+                                            <p:cond delay="0"/>
+                                          </p:stCondLst>
+                                        </p:cTn>
+                                        <p:tgtEl>
+                                          <p:spTgt spid="8"/>
+                                        </p:tgtEl>
+                                        <p:attrNameLst>
+                                          <p:attrName>style.visibility</p:attrName>
+                                        </p:attrNameLst>
+                                      </p:cBhvr>
+                                      <p:to>
+                                        <p:strVal val="visible"/>
+                                      </p:to>
+                                    </p:set>
+                                    <p:anim calcmode="lin" valueType="num">
+                                      <p:cBhvr additive="base">
+                                        <p:cTn id="31" dur="500"/>
+                                        <p:tgtEl>
+                                          <p:spTgt spid="8"/>
+                                        </p:tgtEl>
+                                        <p:attrNameLst>
+                                          <p:attrName>ppt_x</p:attrName>
+                                        </p:attrNameLst>
+                                      </p:cBhvr>
+                                      <p:tavLst>
+                                        <p:tav tm="0">
+                                          <p:val>
+                                            <p:strVal val="#ppt_x-#ppt_w*1.125000"/>
+                                          </p:val>
+                                        </p:tav>
+                                        <p:tav tm="100000">
+                                          <p:val>
+                                            <p:strVal val="#ppt_x"/>
+                                          </p:val>
+                                        </p:tav>
+                                      </p:tavLst>
+                                    </p:anim>
+                                    <p:animEffect transition="in" filter="wipe(right)">
+                                      <p:cBhvr>
+                                        <p:cTn id="32" dur="500"/>
+                                        <p:tgtEl>
+                                          <p:spTgt spid="8"/>
+                                        </p:tgtEl>
+                                      </p:cBhvr>
+                                    </p:animEffect>
+                                  </p:childTnLst>
+                                </p:cTn>
+                              </p:par>
+                            </p:childTnLst>
+                          </p:cTn>
+                        </p:par>
+                      </p:childTnLst>
+                    </p:cTn>
+                  </p:par>
+                </p:childTnLst>
+              </p:cTn>
+              <p:prevCondLst>
+                <p:cond evt="onPrev" delay="0">
+                  <p:tgtEl>
+                    <p:sldTgt/>
+                  </p:tgtEl>
+                </p:cond>
+              </p:prevCondLst>
+              <p:nextCondLst>
+                <p:cond evt="onNext" delay="0">
+                  <p:tgtEl>
+                    <p:sldTgt/>
+                  </p:tgtEl>
+                </p:cond>
+              </p:nextCondLst>
+            </p:seq>
+          </p:childTnLst>
+        </p:cTn>
       </p:par>
     </p:tnLst>
+    <p:bldLst>
+      <p:bldP spid="5" grpId="0"/>
+      <p:bldP spid="6" grpId="0"/>
+      <p:bldP spid="7" grpId="0"/>
+      <p:bldP spid="8" grpId="0"/>
+      <p:bldP spid="10" grpId="0"/>
+    </p:bldLst>
   </p:timing>
 </p:sld>
 </file>

</xml_diff>

<commit_message>
Changes done on presentation
The changes were done when the presentation was done.
</commit_message>
<xml_diff>
--- a/IntoAdventure.pptx
+++ b/IntoAdventure.pptx
@@ -195,7 +195,7 @@
           <a:p>
             <a:fld id="{031A93CE-0D5D-AF46-B896-FA0EC01A9796}" type="datetimeFigureOut">
               <a:rPr lang="en-US" smtClean="0"/>
-              <a:t>01/09/15</a:t>
+              <a:t>28/09/15</a:t>
             </a:fld>
             <a:endParaRPr lang="en-US"/>
           </a:p>
@@ -689,17 +689,56 @@
           <a:p>
             <a:r>
               <a:rPr lang="en-US" dirty="0" smtClean="0"/>
-              <a:t>Eric S. Raymond Lisp</a:t>
+              <a:t>For Yourself</a:t>
             </a:r>
             <a:r>
               <a:rPr lang="en-US" baseline="0" dirty="0" smtClean="0"/>
-              <a:t> will make you a better programmer</a:t>
-            </a:r>
-          </a:p>
-          <a:p>
+              <a:t> - </a:t>
+            </a:r>
+            <a:r>
+              <a:rPr lang="en-US" dirty="0" smtClean="0"/>
+              <a:t>Eric </a:t>
+            </a:r>
+            <a:r>
+              <a:rPr lang="en-US" dirty="0" smtClean="0"/>
+              <a:t>S. Raymond </a:t>
+            </a:r>
+            <a:r>
+              <a:rPr lang="en-US" dirty="0" smtClean="0"/>
+              <a:t>– How to become a hacker - Lisp</a:t>
+            </a:r>
             <a:r>
               <a:rPr lang="en-US" baseline="0" dirty="0" smtClean="0"/>
-              <a:t>Robert C. Martin NDC London 2013 conference talk</a:t>
+              <a:t> </a:t>
+            </a:r>
+            <a:r>
+              <a:rPr lang="en-US" baseline="0" dirty="0" smtClean="0"/>
+              <a:t>will make you a better </a:t>
+            </a:r>
+            <a:r>
+              <a:rPr lang="en-US" baseline="0" dirty="0" smtClean="0"/>
+              <a:t>programmer</a:t>
+            </a:r>
+          </a:p>
+          <a:p>
+            <a:r>
+              <a:rPr lang="en-US" baseline="0" dirty="0" smtClean="0"/>
+              <a:t>Terseness – Paul Graham – Beating the averages</a:t>
+            </a:r>
+            <a:endParaRPr lang="en-US" baseline="0" dirty="0" smtClean="0"/>
+          </a:p>
+          <a:p>
+            <a:r>
+              <a:rPr lang="en-US" baseline="0" dirty="0" smtClean="0"/>
+              <a:t>Easier concurrency - Robert </a:t>
+            </a:r>
+            <a:r>
+              <a:rPr lang="en-US" baseline="0" dirty="0" smtClean="0"/>
+              <a:t>C. Martin NDC London 2013 conference </a:t>
+            </a:r>
+            <a:r>
+              <a:rPr lang="en-US" baseline="0" dirty="0" smtClean="0"/>
+              <a:t>talk</a:t>
             </a:r>
             <a:endParaRPr lang="en-US" dirty="0"/>
           </a:p>
@@ -791,7 +830,37 @@
             </a:r>
             <a:r>
               <a:rPr lang="en-US" baseline="0" dirty="0" smtClean="0"/>
-              <a:t> of beautifulness. It is the ideas that we are interested on.</a:t>
+              <a:t> of beautifulness. It is the ideas that we are </a:t>
+            </a:r>
+            <a:r>
+              <a:rPr lang="en-US" baseline="0" dirty="0" smtClean="0"/>
+              <a:t>interested </a:t>
+            </a:r>
+            <a:r>
+              <a:rPr lang="en-US" baseline="0" dirty="0" smtClean="0"/>
+              <a:t>on</a:t>
+            </a:r>
+            <a:r>
+              <a:rPr lang="en-US" baseline="0" dirty="0" smtClean="0"/>
+              <a:t>.</a:t>
+            </a:r>
+          </a:p>
+          <a:p>
+            <a:r>
+              <a:rPr lang="en-US" baseline="0" dirty="0" smtClean="0"/>
+              <a:t>6 languages : C#-F# / Java-</a:t>
+            </a:r>
+            <a:r>
+              <a:rPr lang="en-US" baseline="0" dirty="0" err="1" smtClean="0"/>
+              <a:t>Clojure</a:t>
+            </a:r>
+            <a:r>
+              <a:rPr lang="en-US" baseline="0" dirty="0" smtClean="0"/>
+              <a:t> / Ruby</a:t>
+            </a:r>
+            <a:r>
+              <a:rPr lang="en-US" baseline="0" smtClean="0"/>
+              <a:t>-Elixir</a:t>
             </a:r>
             <a:endParaRPr lang="en-US" dirty="0" smtClean="0"/>
           </a:p>
@@ -1237,7 +1306,7 @@
             <a:fld id="{E637BB6B-EE1B-48FB-8575-0D55C373DE88}" type="datetimeFigureOut">
               <a:rPr lang="en-US" smtClean="0"/>
               <a:pPr eaLnBrk="1" latinLnBrk="0" hangingPunct="1"/>
-              <a:t>01/09/15</a:t>
+              <a:t>28/09/15</a:t>
             </a:fld>
             <a:endParaRPr lang="en-US"/>
           </a:p>
@@ -1405,7 +1474,7 @@
             <a:fld id="{E637BB6B-EE1B-48FB-8575-0D55C373DE88}" type="datetimeFigureOut">
               <a:rPr lang="en-US" smtClean="0"/>
               <a:pPr eaLnBrk="1" latinLnBrk="0" hangingPunct="1"/>
-              <a:t>01/09/15</a:t>
+              <a:t>28/09/15</a:t>
             </a:fld>
             <a:endParaRPr lang="en-US" dirty="0"/>
           </a:p>
@@ -1583,7 +1652,7 @@
             <a:fld id="{E637BB6B-EE1B-48FB-8575-0D55C373DE88}" type="datetimeFigureOut">
               <a:rPr lang="en-US" smtClean="0"/>
               <a:pPr eaLnBrk="1" latinLnBrk="0" hangingPunct="1"/>
-              <a:t>01/09/15</a:t>
+              <a:t>28/09/15</a:t>
             </a:fld>
             <a:endParaRPr lang="en-US"/>
           </a:p>
@@ -1755,7 +1824,7 @@
             <a:fld id="{E637BB6B-EE1B-48FB-8575-0D55C373DE88}" type="datetimeFigureOut">
               <a:rPr lang="en-US" smtClean="0"/>
               <a:pPr eaLnBrk="1" latinLnBrk="0" hangingPunct="1"/>
-              <a:t>01/09/15</a:t>
+              <a:t>28/09/15</a:t>
             </a:fld>
             <a:endParaRPr lang="en-US"/>
           </a:p>
@@ -2213,7 +2282,7 @@
             <a:fld id="{E637BB6B-EE1B-48FB-8575-0D55C373DE88}" type="datetimeFigureOut">
               <a:rPr lang="en-US" smtClean="0"/>
               <a:pPr eaLnBrk="1" latinLnBrk="0" hangingPunct="1"/>
-              <a:t>01/09/15</a:t>
+              <a:t>28/09/15</a:t>
             </a:fld>
             <a:endParaRPr lang="en-US"/>
           </a:p>
@@ -2480,7 +2549,7 @@
             <a:fld id="{E637BB6B-EE1B-48FB-8575-0D55C373DE88}" type="datetimeFigureOut">
               <a:rPr lang="en-US" smtClean="0"/>
               <a:pPr eaLnBrk="1" latinLnBrk="0" hangingPunct="1"/>
-              <a:t>01/09/15</a:t>
+              <a:t>28/09/15</a:t>
             </a:fld>
             <a:endParaRPr lang="en-US"/>
           </a:p>
@@ -2857,7 +2926,7 @@
             <a:fld id="{E637BB6B-EE1B-48FB-8575-0D55C373DE88}" type="datetimeFigureOut">
               <a:rPr lang="en-US" smtClean="0"/>
               <a:pPr eaLnBrk="1" latinLnBrk="0" hangingPunct="1"/>
-              <a:t>01/09/15</a:t>
+              <a:t>28/09/15</a:t>
             </a:fld>
             <a:endParaRPr lang="en-US"/>
           </a:p>
@@ -2982,7 +3051,7 @@
             <a:fld id="{E637BB6B-EE1B-48FB-8575-0D55C373DE88}" type="datetimeFigureOut">
               <a:rPr lang="en-US" smtClean="0"/>
               <a:pPr eaLnBrk="1" latinLnBrk="0" hangingPunct="1"/>
-              <a:t>01/09/15</a:t>
+              <a:t>28/09/15</a:t>
             </a:fld>
             <a:endParaRPr lang="en-US"/>
           </a:p>
@@ -3075,7 +3144,7 @@
             <a:fld id="{E637BB6B-EE1B-48FB-8575-0D55C373DE88}" type="datetimeFigureOut">
               <a:rPr lang="en-US" smtClean="0"/>
               <a:pPr eaLnBrk="1" latinLnBrk="0" hangingPunct="1"/>
-              <a:t>01/09/15</a:t>
+              <a:t>28/09/15</a:t>
             </a:fld>
             <a:endParaRPr lang="en-US"/>
           </a:p>
@@ -3327,7 +3396,7 @@
             <a:fld id="{E637BB6B-EE1B-48FB-8575-0D55C373DE88}" type="datetimeFigureOut">
               <a:rPr lang="en-US" smtClean="0"/>
               <a:pPr eaLnBrk="1" latinLnBrk="0" hangingPunct="1"/>
-              <a:t>01/09/15</a:t>
+              <a:t>28/09/15</a:t>
             </a:fld>
             <a:endParaRPr lang="en-US"/>
           </a:p>
@@ -3589,7 +3658,7 @@
             <a:fld id="{E637BB6B-EE1B-48FB-8575-0D55C373DE88}" type="datetimeFigureOut">
               <a:rPr lang="en-US" smtClean="0"/>
               <a:pPr eaLnBrk="1" latinLnBrk="0" hangingPunct="1"/>
-              <a:t>01/09/15</a:t>
+              <a:t>28/09/15</a:t>
             </a:fld>
             <a:endParaRPr lang="en-US"/>
           </a:p>
@@ -3996,7 +4065,7 @@
             <a:fld id="{E637BB6B-EE1B-48FB-8575-0D55C373DE88}" type="datetimeFigureOut">
               <a:rPr lang="en-US" smtClean="0"/>
               <a:pPr eaLnBrk="1" latinLnBrk="0" hangingPunct="1"/>
-              <a:t>01/09/15</a:t>
+              <a:t>28/09/15</a:t>
             </a:fld>
             <a:endParaRPr lang="en-US" sz="1000">
               <a:solidFill>

</xml_diff>